<commit_message>
Added autocorrelation analysis part
</commit_message>
<xml_diff>
--- a/Zwischenpräsentation.pptx
+++ b/Zwischenpräsentation.pptx
@@ -10,12 +10,15 @@
     <p:sldId id="261" r:id="rId4"/>
     <p:sldId id="258" r:id="rId5"/>
     <p:sldId id="267" r:id="rId6"/>
-    <p:sldId id="260" r:id="rId7"/>
-    <p:sldId id="259" r:id="rId8"/>
-    <p:sldId id="262" r:id="rId9"/>
-    <p:sldId id="264" r:id="rId10"/>
-    <p:sldId id="263" r:id="rId11"/>
-    <p:sldId id="265" r:id="rId12"/>
+    <p:sldId id="269" r:id="rId7"/>
+    <p:sldId id="260" r:id="rId8"/>
+    <p:sldId id="270" r:id="rId9"/>
+    <p:sldId id="271" r:id="rId10"/>
+    <p:sldId id="272" r:id="rId11"/>
+    <p:sldId id="262" r:id="rId12"/>
+    <p:sldId id="264" r:id="rId13"/>
+    <p:sldId id="263" r:id="rId14"/>
+    <p:sldId id="265" r:id="rId15"/>
   </p:sldIdLst>
   <p:sldSz cx="12192000" cy="6858000"/>
   <p:notesSz cx="6858000" cy="9144000"/>
@@ -114,6 +117,11 @@
       </a:defRPr>
     </a:lvl9pPr>
   </p:defaultTextStyle>
+  <p:extLst>
+    <p:ext uri="{EFAFB233-063F-42B5-8137-9DF3F51BA10A}">
+      <p15:sldGuideLst xmlns:p15="http://schemas.microsoft.com/office/powerpoint/2012/main"/>
+    </p:ext>
+  </p:extLst>
 </p:presentation>
 </file>
 
@@ -862,7 +870,7 @@
           <a:p>
             <a:fld id="{ECF40D30-5C74-43B8-8F71-BAFEBA9E7B41}" type="datetimeFigureOut">
               <a:rPr lang="de-DE" smtClean="0"/>
-              <a:t>07.03.2023</a:t>
+              <a:t>09.03.2023</a:t>
             </a:fld>
             <a:endParaRPr lang="de-DE"/>
           </a:p>
@@ -1113,7 +1121,7 @@
           <a:p>
             <a:fld id="{ECF40D30-5C74-43B8-8F71-BAFEBA9E7B41}" type="datetimeFigureOut">
               <a:rPr lang="de-DE" smtClean="0"/>
-              <a:t>07.03.2023</a:t>
+              <a:t>09.03.2023</a:t>
             </a:fld>
             <a:endParaRPr lang="de-DE"/>
           </a:p>
@@ -1427,7 +1435,7 @@
           <a:p>
             <a:fld id="{ECF40D30-5C74-43B8-8F71-BAFEBA9E7B41}" type="datetimeFigureOut">
               <a:rPr lang="de-DE" smtClean="0"/>
-              <a:t>07.03.2023</a:t>
+              <a:t>09.03.2023</a:t>
             </a:fld>
             <a:endParaRPr lang="de-DE"/>
           </a:p>
@@ -1760,7 +1768,7 @@
           <a:p>
             <a:fld id="{ECF40D30-5C74-43B8-8F71-BAFEBA9E7B41}" type="datetimeFigureOut">
               <a:rPr lang="de-DE" smtClean="0"/>
-              <a:t>07.03.2023</a:t>
+              <a:t>09.03.2023</a:t>
             </a:fld>
             <a:endParaRPr lang="de-DE"/>
           </a:p>
@@ -2074,7 +2082,7 @@
           <a:p>
             <a:fld id="{ECF40D30-5C74-43B8-8F71-BAFEBA9E7B41}" type="datetimeFigureOut">
               <a:rPr lang="de-DE" smtClean="0"/>
-              <a:t>07.03.2023</a:t>
+              <a:t>09.03.2023</a:t>
             </a:fld>
             <a:endParaRPr lang="de-DE"/>
           </a:p>
@@ -2467,7 +2475,7 @@
           <a:p>
             <a:fld id="{ECF40D30-5C74-43B8-8F71-BAFEBA9E7B41}" type="datetimeFigureOut">
               <a:rPr lang="de-DE" smtClean="0"/>
-              <a:t>07.03.2023</a:t>
+              <a:t>09.03.2023</a:t>
             </a:fld>
             <a:endParaRPr lang="de-DE"/>
           </a:p>
@@ -2637,7 +2645,7 @@
           <a:p>
             <a:fld id="{ECF40D30-5C74-43B8-8F71-BAFEBA9E7B41}" type="datetimeFigureOut">
               <a:rPr lang="de-DE" smtClean="0"/>
-              <a:t>07.03.2023</a:t>
+              <a:t>09.03.2023</a:t>
             </a:fld>
             <a:endParaRPr lang="de-DE"/>
           </a:p>
@@ -2817,7 +2825,7 @@
           <a:p>
             <a:fld id="{ECF40D30-5C74-43B8-8F71-BAFEBA9E7B41}" type="datetimeFigureOut">
               <a:rPr lang="de-DE" smtClean="0"/>
-              <a:t>07.03.2023</a:t>
+              <a:t>09.03.2023</a:t>
             </a:fld>
             <a:endParaRPr lang="de-DE"/>
           </a:p>
@@ -2987,7 +2995,7 @@
           <a:p>
             <a:fld id="{ECF40D30-5C74-43B8-8F71-BAFEBA9E7B41}" type="datetimeFigureOut">
               <a:rPr lang="de-DE" smtClean="0"/>
-              <a:t>07.03.2023</a:t>
+              <a:t>09.03.2023</a:t>
             </a:fld>
             <a:endParaRPr lang="de-DE"/>
           </a:p>
@@ -3234,7 +3242,7 @@
           <a:p>
             <a:fld id="{ECF40D30-5C74-43B8-8F71-BAFEBA9E7B41}" type="datetimeFigureOut">
               <a:rPr lang="de-DE" smtClean="0"/>
-              <a:t>07.03.2023</a:t>
+              <a:t>09.03.2023</a:t>
             </a:fld>
             <a:endParaRPr lang="de-DE"/>
           </a:p>
@@ -3466,7 +3474,7 @@
           <a:p>
             <a:fld id="{ECF40D30-5C74-43B8-8F71-BAFEBA9E7B41}" type="datetimeFigureOut">
               <a:rPr lang="de-DE" smtClean="0"/>
-              <a:t>07.03.2023</a:t>
+              <a:t>09.03.2023</a:t>
             </a:fld>
             <a:endParaRPr lang="de-DE"/>
           </a:p>
@@ -3840,7 +3848,7 @@
           <a:p>
             <a:fld id="{ECF40D30-5C74-43B8-8F71-BAFEBA9E7B41}" type="datetimeFigureOut">
               <a:rPr lang="de-DE" smtClean="0"/>
-              <a:t>07.03.2023</a:t>
+              <a:t>09.03.2023</a:t>
             </a:fld>
             <a:endParaRPr lang="de-DE"/>
           </a:p>
@@ -3963,7 +3971,7 @@
           <a:p>
             <a:fld id="{ECF40D30-5C74-43B8-8F71-BAFEBA9E7B41}" type="datetimeFigureOut">
               <a:rPr lang="de-DE" smtClean="0"/>
-              <a:t>07.03.2023</a:t>
+              <a:t>09.03.2023</a:t>
             </a:fld>
             <a:endParaRPr lang="de-DE"/>
           </a:p>
@@ -4058,7 +4066,7 @@
           <a:p>
             <a:fld id="{ECF40D30-5C74-43B8-8F71-BAFEBA9E7B41}" type="datetimeFigureOut">
               <a:rPr lang="de-DE" smtClean="0"/>
-              <a:t>07.03.2023</a:t>
+              <a:t>09.03.2023</a:t>
             </a:fld>
             <a:endParaRPr lang="de-DE"/>
           </a:p>
@@ -4313,7 +4321,7 @@
           <a:p>
             <a:fld id="{ECF40D30-5C74-43B8-8F71-BAFEBA9E7B41}" type="datetimeFigureOut">
               <a:rPr lang="de-DE" smtClean="0"/>
-              <a:t>07.03.2023</a:t>
+              <a:t>09.03.2023</a:t>
             </a:fld>
             <a:endParaRPr lang="de-DE"/>
           </a:p>
@@ -4618,7 +4626,7 @@
           <a:p>
             <a:fld id="{ECF40D30-5C74-43B8-8F71-BAFEBA9E7B41}" type="datetimeFigureOut">
               <a:rPr lang="de-DE" smtClean="0"/>
-              <a:t>07.03.2023</a:t>
+              <a:t>09.03.2023</a:t>
             </a:fld>
             <a:endParaRPr lang="de-DE"/>
           </a:p>
@@ -5320,7 +5328,7 @@
           <a:p>
             <a:fld id="{ECF40D30-5C74-43B8-8F71-BAFEBA9E7B41}" type="datetimeFigureOut">
               <a:rPr lang="de-DE" smtClean="0"/>
-              <a:t>07.03.2023</a:t>
+              <a:t>09.03.2023</a:t>
             </a:fld>
             <a:endParaRPr lang="de-DE"/>
           </a:p>
@@ -5895,7 +5903,7 @@
         </p:nvSpPr>
         <p:spPr>
           <a:xfrm>
-            <a:off x="671804" y="4939641"/>
+            <a:off x="662473" y="4389135"/>
             <a:ext cx="9144000" cy="1655762"/>
           </a:xfrm>
         </p:spPr>
@@ -6015,6 +6023,3359 @@
       </p:grpSpPr>
       <p:sp>
         <p:nvSpPr>
+          <p:cNvPr id="4" name="Inhaltsplatzhalter 2">
+            <a:extLst>
+              <a:ext uri="{FF2B5EF4-FFF2-40B4-BE49-F238E27FC236}">
+                <a16:creationId xmlns:a16="http://schemas.microsoft.com/office/drawing/2014/main" id="{722EC0B3-BCF7-A1B8-58CA-05707A744DBA}"/>
+              </a:ext>
+            </a:extLst>
+          </p:cNvPr>
+          <p:cNvSpPr txBox="1">
+            <a:spLocks/>
+          </p:cNvSpPr>
+          <p:nvPr/>
+        </p:nvSpPr>
+        <p:spPr>
+          <a:xfrm>
+            <a:off x="657014" y="633283"/>
+            <a:ext cx="9736666" cy="5262245"/>
+          </a:xfrm>
+          <a:prstGeom prst="rect">
+            <a:avLst/>
+          </a:prstGeom>
+        </p:spPr>
+        <p:txBody>
+          <a:bodyPr>
+            <a:normAutofit/>
+          </a:bodyPr>
+          <a:lstStyle>
+            <a:lvl1pPr marL="342900" indent="-342900" algn="l" defTabSz="457200" rtl="0" eaLnBrk="1" latinLnBrk="0" hangingPunct="1">
+              <a:spcBef>
+                <a:spcPts val="1000"/>
+              </a:spcBef>
+              <a:spcAft>
+                <a:spcPts val="0"/>
+              </a:spcAft>
+              <a:buClr>
+                <a:schemeClr val="accent1"/>
+              </a:buClr>
+              <a:buSzPct val="80000"/>
+              <a:buFont typeface="Wingdings 3" charset="2"/>
+              <a:buChar char=""/>
+              <a:defRPr sz="1800" kern="1200">
+                <a:solidFill>
+                  <a:schemeClr val="tx1">
+                    <a:lumMod val="75000"/>
+                    <a:lumOff val="25000"/>
+                  </a:schemeClr>
+                </a:solidFill>
+                <a:latin typeface="+mn-lt"/>
+                <a:ea typeface="+mn-ea"/>
+                <a:cs typeface="+mn-cs"/>
+              </a:defRPr>
+            </a:lvl1pPr>
+            <a:lvl2pPr marL="742950" indent="-285750" algn="l" defTabSz="457200" rtl="0" eaLnBrk="1" latinLnBrk="0" hangingPunct="1">
+              <a:spcBef>
+                <a:spcPts val="1000"/>
+              </a:spcBef>
+              <a:spcAft>
+                <a:spcPts val="0"/>
+              </a:spcAft>
+              <a:buClr>
+                <a:schemeClr val="accent1"/>
+              </a:buClr>
+              <a:buSzPct val="80000"/>
+              <a:buFont typeface="Wingdings 3" charset="2"/>
+              <a:buChar char=""/>
+              <a:defRPr sz="1600" kern="1200">
+                <a:solidFill>
+                  <a:schemeClr val="tx1">
+                    <a:lumMod val="75000"/>
+                    <a:lumOff val="25000"/>
+                  </a:schemeClr>
+                </a:solidFill>
+                <a:latin typeface="+mn-lt"/>
+                <a:ea typeface="+mn-ea"/>
+                <a:cs typeface="+mn-cs"/>
+              </a:defRPr>
+            </a:lvl2pPr>
+            <a:lvl3pPr marL="1143000" indent="-228600" algn="l" defTabSz="457200" rtl="0" eaLnBrk="1" latinLnBrk="0" hangingPunct="1">
+              <a:spcBef>
+                <a:spcPts val="1000"/>
+              </a:spcBef>
+              <a:spcAft>
+                <a:spcPts val="0"/>
+              </a:spcAft>
+              <a:buClr>
+                <a:schemeClr val="accent1"/>
+              </a:buClr>
+              <a:buSzPct val="80000"/>
+              <a:buFont typeface="Wingdings 3" charset="2"/>
+              <a:buChar char=""/>
+              <a:defRPr sz="1400" kern="1200">
+                <a:solidFill>
+                  <a:schemeClr val="tx1">
+                    <a:lumMod val="75000"/>
+                    <a:lumOff val="25000"/>
+                  </a:schemeClr>
+                </a:solidFill>
+                <a:latin typeface="+mn-lt"/>
+                <a:ea typeface="+mn-ea"/>
+                <a:cs typeface="+mn-cs"/>
+              </a:defRPr>
+            </a:lvl3pPr>
+            <a:lvl4pPr marL="1600200" indent="-228600" algn="l" defTabSz="457200" rtl="0" eaLnBrk="1" latinLnBrk="0" hangingPunct="1">
+              <a:spcBef>
+                <a:spcPts val="1000"/>
+              </a:spcBef>
+              <a:spcAft>
+                <a:spcPts val="0"/>
+              </a:spcAft>
+              <a:buClr>
+                <a:schemeClr val="accent1"/>
+              </a:buClr>
+              <a:buSzPct val="80000"/>
+              <a:buFont typeface="Wingdings 3" charset="2"/>
+              <a:buChar char=""/>
+              <a:defRPr sz="1200" kern="1200">
+                <a:solidFill>
+                  <a:schemeClr val="tx1">
+                    <a:lumMod val="75000"/>
+                    <a:lumOff val="25000"/>
+                  </a:schemeClr>
+                </a:solidFill>
+                <a:latin typeface="+mn-lt"/>
+                <a:ea typeface="+mn-ea"/>
+                <a:cs typeface="+mn-cs"/>
+              </a:defRPr>
+            </a:lvl4pPr>
+            <a:lvl5pPr marL="2057400" indent="-228600" algn="l" defTabSz="457200" rtl="0" eaLnBrk="1" latinLnBrk="0" hangingPunct="1">
+              <a:spcBef>
+                <a:spcPts val="1000"/>
+              </a:spcBef>
+              <a:spcAft>
+                <a:spcPts val="0"/>
+              </a:spcAft>
+              <a:buClr>
+                <a:schemeClr val="accent1"/>
+              </a:buClr>
+              <a:buSzPct val="80000"/>
+              <a:buFont typeface="Wingdings 3" charset="2"/>
+              <a:buChar char=""/>
+              <a:defRPr sz="1200" kern="1200">
+                <a:solidFill>
+                  <a:schemeClr val="tx1">
+                    <a:lumMod val="75000"/>
+                    <a:lumOff val="25000"/>
+                  </a:schemeClr>
+                </a:solidFill>
+                <a:latin typeface="+mn-lt"/>
+                <a:ea typeface="+mn-ea"/>
+                <a:cs typeface="+mn-cs"/>
+              </a:defRPr>
+            </a:lvl5pPr>
+            <a:lvl6pPr marL="2514600" indent="-228600" algn="l" defTabSz="457200" rtl="0" eaLnBrk="1" latinLnBrk="0" hangingPunct="1">
+              <a:spcBef>
+                <a:spcPts val="1000"/>
+              </a:spcBef>
+              <a:spcAft>
+                <a:spcPts val="0"/>
+              </a:spcAft>
+              <a:buClr>
+                <a:schemeClr val="accent1"/>
+              </a:buClr>
+              <a:buSzPct val="80000"/>
+              <a:buFont typeface="Wingdings 3" charset="2"/>
+              <a:buChar char=""/>
+              <a:defRPr sz="1200" kern="1200">
+                <a:solidFill>
+                  <a:schemeClr val="tx1">
+                    <a:lumMod val="75000"/>
+                    <a:lumOff val="25000"/>
+                  </a:schemeClr>
+                </a:solidFill>
+                <a:latin typeface="+mn-lt"/>
+                <a:ea typeface="+mn-ea"/>
+                <a:cs typeface="+mn-cs"/>
+              </a:defRPr>
+            </a:lvl6pPr>
+            <a:lvl7pPr marL="2971800" indent="-228600" algn="l" defTabSz="457200" rtl="0" eaLnBrk="1" latinLnBrk="0" hangingPunct="1">
+              <a:spcBef>
+                <a:spcPts val="1000"/>
+              </a:spcBef>
+              <a:spcAft>
+                <a:spcPts val="0"/>
+              </a:spcAft>
+              <a:buClr>
+                <a:schemeClr val="accent1"/>
+              </a:buClr>
+              <a:buSzPct val="80000"/>
+              <a:buFont typeface="Wingdings 3" charset="2"/>
+              <a:buChar char=""/>
+              <a:defRPr sz="1200" kern="1200">
+                <a:solidFill>
+                  <a:schemeClr val="tx1">
+                    <a:lumMod val="75000"/>
+                    <a:lumOff val="25000"/>
+                  </a:schemeClr>
+                </a:solidFill>
+                <a:latin typeface="+mn-lt"/>
+                <a:ea typeface="+mn-ea"/>
+                <a:cs typeface="+mn-cs"/>
+              </a:defRPr>
+            </a:lvl7pPr>
+            <a:lvl8pPr marL="3429000" indent="-228600" algn="l" defTabSz="457200" rtl="0" eaLnBrk="1" latinLnBrk="0" hangingPunct="1">
+              <a:spcBef>
+                <a:spcPts val="1000"/>
+              </a:spcBef>
+              <a:spcAft>
+                <a:spcPts val="0"/>
+              </a:spcAft>
+              <a:buClr>
+                <a:schemeClr val="accent1"/>
+              </a:buClr>
+              <a:buSzPct val="80000"/>
+              <a:buFont typeface="Wingdings 3" charset="2"/>
+              <a:buChar char=""/>
+              <a:defRPr sz="1200" kern="1200">
+                <a:solidFill>
+                  <a:schemeClr val="tx1">
+                    <a:lumMod val="75000"/>
+                    <a:lumOff val="25000"/>
+                  </a:schemeClr>
+                </a:solidFill>
+                <a:latin typeface="+mn-lt"/>
+                <a:ea typeface="+mn-ea"/>
+                <a:cs typeface="+mn-cs"/>
+              </a:defRPr>
+            </a:lvl8pPr>
+            <a:lvl9pPr marL="3886200" indent="-228600" algn="l" defTabSz="457200" rtl="0" eaLnBrk="1" latinLnBrk="0" hangingPunct="1">
+              <a:spcBef>
+                <a:spcPts val="1000"/>
+              </a:spcBef>
+              <a:spcAft>
+                <a:spcPts val="0"/>
+              </a:spcAft>
+              <a:buClr>
+                <a:schemeClr val="accent1"/>
+              </a:buClr>
+              <a:buSzPct val="80000"/>
+              <a:buFont typeface="Wingdings 3" charset="2"/>
+              <a:buChar char=""/>
+              <a:defRPr sz="1200" kern="1200">
+                <a:solidFill>
+                  <a:schemeClr val="tx1">
+                    <a:lumMod val="75000"/>
+                    <a:lumOff val="25000"/>
+                  </a:schemeClr>
+                </a:solidFill>
+                <a:latin typeface="+mn-lt"/>
+                <a:ea typeface="+mn-ea"/>
+                <a:cs typeface="+mn-cs"/>
+              </a:defRPr>
+            </a:lvl9pPr>
+          </a:lstStyle>
+          <a:p>
+            <a:pPr marL="0" indent="0">
+              <a:buNone/>
+            </a:pPr>
+            <a:r>
+              <a:rPr lang="de-DE" dirty="0"/>
+              <a:t>Ermittlung der jeweiligen Anzahl an Lags mit signifikanten Autokorrelationskoeffizienten</a:t>
+            </a:r>
+          </a:p>
+          <a:p>
+            <a:r>
+              <a:rPr lang="de-DE" dirty="0"/>
+              <a:t>Zielvariablen:</a:t>
+            </a:r>
+          </a:p>
+          <a:p>
+            <a:endParaRPr lang="de-DE" dirty="0"/>
+          </a:p>
+          <a:p>
+            <a:endParaRPr lang="de-DE" dirty="0"/>
+          </a:p>
+          <a:p>
+            <a:endParaRPr lang="de-DE" dirty="0"/>
+          </a:p>
+          <a:p>
+            <a:endParaRPr lang="de-DE" dirty="0"/>
+          </a:p>
+          <a:p>
+            <a:pPr marL="0" indent="0">
+              <a:buNone/>
+            </a:pPr>
+            <a:endParaRPr lang="de-DE" dirty="0"/>
+          </a:p>
+          <a:p>
+            <a:r>
+              <a:rPr lang="de-DE" dirty="0"/>
+              <a:t>Mögliche Treiber:</a:t>
+            </a:r>
+          </a:p>
+        </p:txBody>
+      </p:sp>
+      <p:graphicFrame>
+        <p:nvGraphicFramePr>
+          <p:cNvPr id="5" name="Tabelle 4">
+            <a:extLst>
+              <a:ext uri="{FF2B5EF4-FFF2-40B4-BE49-F238E27FC236}">
+                <a16:creationId xmlns:a16="http://schemas.microsoft.com/office/drawing/2014/main" id="{B0D3F32D-08D1-5895-162F-D94E08B4B702}"/>
+              </a:ext>
+            </a:extLst>
+          </p:cNvPr>
+          <p:cNvGraphicFramePr>
+            <a:graphicFrameLocks noGrp="1"/>
+          </p:cNvGraphicFramePr>
+          <p:nvPr>
+            <p:extLst>
+              <p:ext uri="{D42A27DB-BD31-4B8C-83A1-F6EECF244321}">
+                <p14:modId xmlns:p14="http://schemas.microsoft.com/office/powerpoint/2010/main" val="1618873188"/>
+              </p:ext>
+            </p:extLst>
+          </p:nvPr>
+        </p:nvGraphicFramePr>
+        <p:xfrm>
+          <a:off x="657014" y="1466084"/>
+          <a:ext cx="8689340" cy="1798321"/>
+        </p:xfrm>
+        <a:graphic>
+          <a:graphicData uri="http://schemas.openxmlformats.org/drawingml/2006/table">
+            <a:tbl>
+              <a:tblPr firstRow="1" firstCol="1" bandRow="1">
+                <a:tableStyleId>{5C22544A-7EE6-4342-B048-85BDC9FD1C3A}</a:tableStyleId>
+              </a:tblPr>
+              <a:tblGrid>
+                <a:gridCol w="2895808">
+                  <a:extLst>
+                    <a:ext uri="{9D8B030D-6E8A-4147-A177-3AD203B41FA5}">
+                      <a16:colId xmlns:a16="http://schemas.microsoft.com/office/drawing/2014/main" val="2732468089"/>
+                    </a:ext>
+                  </a:extLst>
+                </a:gridCol>
+                <a:gridCol w="2896766">
+                  <a:extLst>
+                    <a:ext uri="{9D8B030D-6E8A-4147-A177-3AD203B41FA5}">
+                      <a16:colId xmlns:a16="http://schemas.microsoft.com/office/drawing/2014/main" val="802986622"/>
+                    </a:ext>
+                  </a:extLst>
+                </a:gridCol>
+                <a:gridCol w="2896766">
+                  <a:extLst>
+                    <a:ext uri="{9D8B030D-6E8A-4147-A177-3AD203B41FA5}">
+                      <a16:colId xmlns:a16="http://schemas.microsoft.com/office/drawing/2014/main" val="3519412434"/>
+                    </a:ext>
+                  </a:extLst>
+                </a:gridCol>
+              </a:tblGrid>
+              <a:tr h="256903">
+                <a:tc>
+                  <a:txBody>
+                    <a:bodyPr/>
+                    <a:lstStyle/>
+                    <a:p>
+                      <a:pPr>
+                        <a:lnSpc>
+                          <a:spcPct val="107000"/>
+                        </a:lnSpc>
+                        <a:spcAft>
+                          <a:spcPts val="800"/>
+                        </a:spcAft>
+                      </a:pPr>
+                      <a:r>
+                        <a:rPr lang="de-DE" sz="1200">
+                          <a:effectLst/>
+                        </a:rPr>
+                        <a:t> </a:t>
+                      </a:r>
+                      <a:endParaRPr lang="de-DE" sz="1100">
+                        <a:effectLst/>
+                        <a:latin typeface="Calibri" panose="020F0502020204030204" pitchFamily="34" charset="0"/>
+                        <a:ea typeface="Calibri" panose="020F0502020204030204" pitchFamily="34" charset="0"/>
+                        <a:cs typeface="Times New Roman" panose="02020603050405020304" pitchFamily="18" charset="0"/>
+                      </a:endParaRPr>
+                    </a:p>
+                  </a:txBody>
+                  <a:tcPr marL="68580" marR="68580" marT="0" marB="0"/>
+                </a:tc>
+                <a:tc>
+                  <a:txBody>
+                    <a:bodyPr/>
+                    <a:lstStyle/>
+                    <a:p>
+                      <a:pPr>
+                        <a:lnSpc>
+                          <a:spcPct val="107000"/>
+                        </a:lnSpc>
+                        <a:spcAft>
+                          <a:spcPts val="800"/>
+                        </a:spcAft>
+                      </a:pPr>
+                      <a:r>
+                        <a:rPr lang="de-DE" sz="1200" dirty="0">
+                          <a:solidFill>
+                            <a:schemeClr val="tx1"/>
+                          </a:solidFill>
+                          <a:effectLst/>
+                        </a:rPr>
+                        <a:t>Abfluss</a:t>
+                      </a:r>
+                      <a:endParaRPr lang="de-DE" sz="1100" dirty="0">
+                        <a:solidFill>
+                          <a:schemeClr val="tx1"/>
+                        </a:solidFill>
+                        <a:effectLst/>
+                        <a:latin typeface="Calibri" panose="020F0502020204030204" pitchFamily="34" charset="0"/>
+                        <a:ea typeface="Calibri" panose="020F0502020204030204" pitchFamily="34" charset="0"/>
+                        <a:cs typeface="Times New Roman" panose="02020603050405020304" pitchFamily="18" charset="0"/>
+                      </a:endParaRPr>
+                    </a:p>
+                  </a:txBody>
+                  <a:tcPr marL="68580" marR="68580" marT="0" marB="0"/>
+                </a:tc>
+                <a:tc>
+                  <a:txBody>
+                    <a:bodyPr/>
+                    <a:lstStyle/>
+                    <a:p>
+                      <a:pPr>
+                        <a:lnSpc>
+                          <a:spcPct val="107000"/>
+                        </a:lnSpc>
+                        <a:spcAft>
+                          <a:spcPts val="800"/>
+                        </a:spcAft>
+                      </a:pPr>
+                      <a:r>
+                        <a:rPr lang="de-DE" sz="1200" dirty="0">
+                          <a:solidFill>
+                            <a:schemeClr val="tx1"/>
+                          </a:solidFill>
+                          <a:effectLst/>
+                        </a:rPr>
+                        <a:t>Niedrigwasserevent</a:t>
+                      </a:r>
+                      <a:endParaRPr lang="de-DE" sz="1100" dirty="0">
+                        <a:solidFill>
+                          <a:schemeClr val="tx1"/>
+                        </a:solidFill>
+                        <a:effectLst/>
+                        <a:latin typeface="Calibri" panose="020F0502020204030204" pitchFamily="34" charset="0"/>
+                        <a:ea typeface="Calibri" panose="020F0502020204030204" pitchFamily="34" charset="0"/>
+                        <a:cs typeface="Times New Roman" panose="02020603050405020304" pitchFamily="18" charset="0"/>
+                      </a:endParaRPr>
+                    </a:p>
+                  </a:txBody>
+                  <a:tcPr marL="68580" marR="68580" marT="0" marB="0"/>
+                </a:tc>
+                <a:extLst>
+                  <a:ext uri="{0D108BD9-81ED-4DB2-BD59-A6C34878D82A}">
+                    <a16:rowId xmlns:a16="http://schemas.microsoft.com/office/drawing/2014/main" val="3210916579"/>
+                  </a:ext>
+                </a:extLst>
+              </a:tr>
+              <a:tr h="256903">
+                <a:tc>
+                  <a:txBody>
+                    <a:bodyPr/>
+                    <a:lstStyle/>
+                    <a:p>
+                      <a:pPr>
+                        <a:lnSpc>
+                          <a:spcPct val="107000"/>
+                        </a:lnSpc>
+                        <a:spcAft>
+                          <a:spcPts val="800"/>
+                        </a:spcAft>
+                      </a:pPr>
+                      <a:r>
+                        <a:rPr lang="de-DE" sz="1200" dirty="0">
+                          <a:solidFill>
+                            <a:schemeClr val="tx1"/>
+                          </a:solidFill>
+                          <a:effectLst/>
+                        </a:rPr>
+                        <a:t>Isar/Mittenwald, Winter</a:t>
+                      </a:r>
+                      <a:endParaRPr lang="de-DE" sz="1100" dirty="0">
+                        <a:solidFill>
+                          <a:schemeClr val="tx1"/>
+                        </a:solidFill>
+                        <a:effectLst/>
+                        <a:latin typeface="Calibri" panose="020F0502020204030204" pitchFamily="34" charset="0"/>
+                        <a:ea typeface="Calibri" panose="020F0502020204030204" pitchFamily="34" charset="0"/>
+                        <a:cs typeface="Times New Roman" panose="02020603050405020304" pitchFamily="18" charset="0"/>
+                      </a:endParaRPr>
+                    </a:p>
+                  </a:txBody>
+                  <a:tcPr marL="68580" marR="68580" marT="0" marB="0"/>
+                </a:tc>
+                <a:tc>
+                  <a:txBody>
+                    <a:bodyPr/>
+                    <a:lstStyle/>
+                    <a:p>
+                      <a:pPr>
+                        <a:lnSpc>
+                          <a:spcPct val="107000"/>
+                        </a:lnSpc>
+                        <a:spcAft>
+                          <a:spcPts val="800"/>
+                        </a:spcAft>
+                      </a:pPr>
+                      <a:r>
+                        <a:rPr lang="de-DE" sz="1200" dirty="0">
+                          <a:effectLst/>
+                        </a:rPr>
+                        <a:t>2</a:t>
+                      </a:r>
+                      <a:endParaRPr lang="de-DE" sz="1100" dirty="0">
+                        <a:effectLst/>
+                        <a:latin typeface="Calibri" panose="020F0502020204030204" pitchFamily="34" charset="0"/>
+                        <a:ea typeface="Calibri" panose="020F0502020204030204" pitchFamily="34" charset="0"/>
+                        <a:cs typeface="Times New Roman" panose="02020603050405020304" pitchFamily="18" charset="0"/>
+                      </a:endParaRPr>
+                    </a:p>
+                  </a:txBody>
+                  <a:tcPr marL="68580" marR="68580" marT="0" marB="0"/>
+                </a:tc>
+                <a:tc>
+                  <a:txBody>
+                    <a:bodyPr/>
+                    <a:lstStyle/>
+                    <a:p>
+                      <a:pPr>
+                        <a:lnSpc>
+                          <a:spcPct val="107000"/>
+                        </a:lnSpc>
+                        <a:spcAft>
+                          <a:spcPts val="800"/>
+                        </a:spcAft>
+                      </a:pPr>
+                      <a:r>
+                        <a:rPr lang="de-DE" sz="1200">
+                          <a:effectLst/>
+                        </a:rPr>
+                        <a:t>4</a:t>
+                      </a:r>
+                      <a:endParaRPr lang="de-DE" sz="1100">
+                        <a:effectLst/>
+                        <a:latin typeface="Calibri" panose="020F0502020204030204" pitchFamily="34" charset="0"/>
+                        <a:ea typeface="Calibri" panose="020F0502020204030204" pitchFamily="34" charset="0"/>
+                        <a:cs typeface="Times New Roman" panose="02020603050405020304" pitchFamily="18" charset="0"/>
+                      </a:endParaRPr>
+                    </a:p>
+                  </a:txBody>
+                  <a:tcPr marL="68580" marR="68580" marT="0" marB="0"/>
+                </a:tc>
+                <a:extLst>
+                  <a:ext uri="{0D108BD9-81ED-4DB2-BD59-A6C34878D82A}">
+                    <a16:rowId xmlns:a16="http://schemas.microsoft.com/office/drawing/2014/main" val="1944963889"/>
+                  </a:ext>
+                </a:extLst>
+              </a:tr>
+              <a:tr h="256903">
+                <a:tc>
+                  <a:txBody>
+                    <a:bodyPr/>
+                    <a:lstStyle/>
+                    <a:p>
+                      <a:pPr>
+                        <a:lnSpc>
+                          <a:spcPct val="107000"/>
+                        </a:lnSpc>
+                        <a:spcAft>
+                          <a:spcPts val="800"/>
+                        </a:spcAft>
+                      </a:pPr>
+                      <a:r>
+                        <a:rPr lang="de-DE" sz="1200" dirty="0">
+                          <a:solidFill>
+                            <a:schemeClr val="tx1"/>
+                          </a:solidFill>
+                          <a:effectLst/>
+                        </a:rPr>
+                        <a:t>Isar/Mittenwald, Sommer</a:t>
+                      </a:r>
+                      <a:endParaRPr lang="de-DE" sz="1100" dirty="0">
+                        <a:solidFill>
+                          <a:schemeClr val="tx1"/>
+                        </a:solidFill>
+                        <a:effectLst/>
+                        <a:latin typeface="Calibri" panose="020F0502020204030204" pitchFamily="34" charset="0"/>
+                        <a:ea typeface="Calibri" panose="020F0502020204030204" pitchFamily="34" charset="0"/>
+                        <a:cs typeface="Times New Roman" panose="02020603050405020304" pitchFamily="18" charset="0"/>
+                      </a:endParaRPr>
+                    </a:p>
+                  </a:txBody>
+                  <a:tcPr marL="68580" marR="68580" marT="0" marB="0"/>
+                </a:tc>
+                <a:tc>
+                  <a:txBody>
+                    <a:bodyPr/>
+                    <a:lstStyle/>
+                    <a:p>
+                      <a:pPr>
+                        <a:lnSpc>
+                          <a:spcPct val="107000"/>
+                        </a:lnSpc>
+                        <a:spcAft>
+                          <a:spcPts val="800"/>
+                        </a:spcAft>
+                      </a:pPr>
+                      <a:r>
+                        <a:rPr lang="de-DE" sz="1200">
+                          <a:effectLst/>
+                        </a:rPr>
+                        <a:t>3</a:t>
+                      </a:r>
+                      <a:endParaRPr lang="de-DE" sz="1100">
+                        <a:effectLst/>
+                        <a:latin typeface="Calibri" panose="020F0502020204030204" pitchFamily="34" charset="0"/>
+                        <a:ea typeface="Calibri" panose="020F0502020204030204" pitchFamily="34" charset="0"/>
+                        <a:cs typeface="Times New Roman" panose="02020603050405020304" pitchFamily="18" charset="0"/>
+                      </a:endParaRPr>
+                    </a:p>
+                  </a:txBody>
+                  <a:tcPr marL="68580" marR="68580" marT="0" marB="0"/>
+                </a:tc>
+                <a:tc>
+                  <a:txBody>
+                    <a:bodyPr/>
+                    <a:lstStyle/>
+                    <a:p>
+                      <a:pPr>
+                        <a:lnSpc>
+                          <a:spcPct val="107000"/>
+                        </a:lnSpc>
+                        <a:spcAft>
+                          <a:spcPts val="800"/>
+                        </a:spcAft>
+                      </a:pPr>
+                      <a:r>
+                        <a:rPr lang="de-DE" sz="1200">
+                          <a:effectLst/>
+                        </a:rPr>
+                        <a:t>1</a:t>
+                      </a:r>
+                      <a:endParaRPr lang="de-DE" sz="1100">
+                        <a:effectLst/>
+                        <a:latin typeface="Calibri" panose="020F0502020204030204" pitchFamily="34" charset="0"/>
+                        <a:ea typeface="Calibri" panose="020F0502020204030204" pitchFamily="34" charset="0"/>
+                        <a:cs typeface="Times New Roman" panose="02020603050405020304" pitchFamily="18" charset="0"/>
+                      </a:endParaRPr>
+                    </a:p>
+                  </a:txBody>
+                  <a:tcPr marL="68580" marR="68580" marT="0" marB="0"/>
+                </a:tc>
+                <a:extLst>
+                  <a:ext uri="{0D108BD9-81ED-4DB2-BD59-A6C34878D82A}">
+                    <a16:rowId xmlns:a16="http://schemas.microsoft.com/office/drawing/2014/main" val="3094559681"/>
+                  </a:ext>
+                </a:extLst>
+              </a:tr>
+              <a:tr h="256903">
+                <a:tc>
+                  <a:txBody>
+                    <a:bodyPr/>
+                    <a:lstStyle/>
+                    <a:p>
+                      <a:pPr>
+                        <a:lnSpc>
+                          <a:spcPct val="107000"/>
+                        </a:lnSpc>
+                        <a:spcAft>
+                          <a:spcPts val="800"/>
+                        </a:spcAft>
+                      </a:pPr>
+                      <a:r>
+                        <a:rPr lang="de-DE" sz="1200" dirty="0">
+                          <a:solidFill>
+                            <a:schemeClr val="tx1"/>
+                          </a:solidFill>
+                          <a:effectLst/>
+                        </a:rPr>
+                        <a:t>Iller/Kempten, Winter</a:t>
+                      </a:r>
+                      <a:endParaRPr lang="de-DE" sz="1100" dirty="0">
+                        <a:solidFill>
+                          <a:schemeClr val="tx1"/>
+                        </a:solidFill>
+                        <a:effectLst/>
+                        <a:latin typeface="Calibri" panose="020F0502020204030204" pitchFamily="34" charset="0"/>
+                        <a:ea typeface="Calibri" panose="020F0502020204030204" pitchFamily="34" charset="0"/>
+                        <a:cs typeface="Times New Roman" panose="02020603050405020304" pitchFamily="18" charset="0"/>
+                      </a:endParaRPr>
+                    </a:p>
+                  </a:txBody>
+                  <a:tcPr marL="68580" marR="68580" marT="0" marB="0"/>
+                </a:tc>
+                <a:tc>
+                  <a:txBody>
+                    <a:bodyPr/>
+                    <a:lstStyle/>
+                    <a:p>
+                      <a:pPr>
+                        <a:lnSpc>
+                          <a:spcPct val="107000"/>
+                        </a:lnSpc>
+                        <a:spcAft>
+                          <a:spcPts val="800"/>
+                        </a:spcAft>
+                      </a:pPr>
+                      <a:r>
+                        <a:rPr lang="de-DE" sz="1200">
+                          <a:effectLst/>
+                        </a:rPr>
+                        <a:t>5</a:t>
+                      </a:r>
+                      <a:endParaRPr lang="de-DE" sz="1100">
+                        <a:effectLst/>
+                        <a:latin typeface="Calibri" panose="020F0502020204030204" pitchFamily="34" charset="0"/>
+                        <a:ea typeface="Calibri" panose="020F0502020204030204" pitchFamily="34" charset="0"/>
+                        <a:cs typeface="Times New Roman" panose="02020603050405020304" pitchFamily="18" charset="0"/>
+                      </a:endParaRPr>
+                    </a:p>
+                  </a:txBody>
+                  <a:tcPr marL="68580" marR="68580" marT="0" marB="0"/>
+                </a:tc>
+                <a:tc>
+                  <a:txBody>
+                    <a:bodyPr/>
+                    <a:lstStyle/>
+                    <a:p>
+                      <a:pPr>
+                        <a:lnSpc>
+                          <a:spcPct val="107000"/>
+                        </a:lnSpc>
+                        <a:spcAft>
+                          <a:spcPts val="800"/>
+                        </a:spcAft>
+                      </a:pPr>
+                      <a:r>
+                        <a:rPr lang="de-DE" sz="1200" dirty="0">
+                          <a:effectLst/>
+                        </a:rPr>
+                        <a:t>4</a:t>
+                      </a:r>
+                      <a:endParaRPr lang="de-DE" sz="1100" dirty="0">
+                        <a:effectLst/>
+                        <a:latin typeface="Calibri" panose="020F0502020204030204" pitchFamily="34" charset="0"/>
+                        <a:ea typeface="Calibri" panose="020F0502020204030204" pitchFamily="34" charset="0"/>
+                        <a:cs typeface="Times New Roman" panose="02020603050405020304" pitchFamily="18" charset="0"/>
+                      </a:endParaRPr>
+                    </a:p>
+                  </a:txBody>
+                  <a:tcPr marL="68580" marR="68580" marT="0" marB="0"/>
+                </a:tc>
+                <a:extLst>
+                  <a:ext uri="{0D108BD9-81ED-4DB2-BD59-A6C34878D82A}">
+                    <a16:rowId xmlns:a16="http://schemas.microsoft.com/office/drawing/2014/main" val="4287271692"/>
+                  </a:ext>
+                </a:extLst>
+              </a:tr>
+              <a:tr h="256903">
+                <a:tc>
+                  <a:txBody>
+                    <a:bodyPr/>
+                    <a:lstStyle/>
+                    <a:p>
+                      <a:pPr>
+                        <a:lnSpc>
+                          <a:spcPct val="107000"/>
+                        </a:lnSpc>
+                        <a:spcAft>
+                          <a:spcPts val="800"/>
+                        </a:spcAft>
+                      </a:pPr>
+                      <a:r>
+                        <a:rPr lang="de-DE" sz="1200" dirty="0">
+                          <a:solidFill>
+                            <a:schemeClr val="tx1"/>
+                          </a:solidFill>
+                          <a:effectLst/>
+                        </a:rPr>
+                        <a:t>Iller/Kempten, Sommer</a:t>
+                      </a:r>
+                      <a:endParaRPr lang="de-DE" sz="1100" dirty="0">
+                        <a:solidFill>
+                          <a:schemeClr val="tx1"/>
+                        </a:solidFill>
+                        <a:effectLst/>
+                        <a:latin typeface="Calibri" panose="020F0502020204030204" pitchFamily="34" charset="0"/>
+                        <a:ea typeface="Calibri" panose="020F0502020204030204" pitchFamily="34" charset="0"/>
+                        <a:cs typeface="Times New Roman" panose="02020603050405020304" pitchFamily="18" charset="0"/>
+                      </a:endParaRPr>
+                    </a:p>
+                  </a:txBody>
+                  <a:tcPr marL="68580" marR="68580" marT="0" marB="0"/>
+                </a:tc>
+                <a:tc>
+                  <a:txBody>
+                    <a:bodyPr/>
+                    <a:lstStyle/>
+                    <a:p>
+                      <a:pPr>
+                        <a:lnSpc>
+                          <a:spcPct val="107000"/>
+                        </a:lnSpc>
+                        <a:spcAft>
+                          <a:spcPts val="800"/>
+                        </a:spcAft>
+                      </a:pPr>
+                      <a:r>
+                        <a:rPr lang="de-DE" sz="1200">
+                          <a:effectLst/>
+                        </a:rPr>
+                        <a:t>3</a:t>
+                      </a:r>
+                      <a:endParaRPr lang="de-DE" sz="1100">
+                        <a:effectLst/>
+                        <a:latin typeface="Calibri" panose="020F0502020204030204" pitchFamily="34" charset="0"/>
+                        <a:ea typeface="Calibri" panose="020F0502020204030204" pitchFamily="34" charset="0"/>
+                        <a:cs typeface="Times New Roman" panose="02020603050405020304" pitchFamily="18" charset="0"/>
+                      </a:endParaRPr>
+                    </a:p>
+                  </a:txBody>
+                  <a:tcPr marL="68580" marR="68580" marT="0" marB="0"/>
+                </a:tc>
+                <a:tc>
+                  <a:txBody>
+                    <a:bodyPr/>
+                    <a:lstStyle/>
+                    <a:p>
+                      <a:pPr>
+                        <a:lnSpc>
+                          <a:spcPct val="107000"/>
+                        </a:lnSpc>
+                        <a:spcAft>
+                          <a:spcPts val="800"/>
+                        </a:spcAft>
+                      </a:pPr>
+                      <a:r>
+                        <a:rPr lang="de-DE" sz="1200" dirty="0">
+                          <a:effectLst/>
+                        </a:rPr>
+                        <a:t>1</a:t>
+                      </a:r>
+                      <a:endParaRPr lang="de-DE" sz="1100" dirty="0">
+                        <a:effectLst/>
+                        <a:latin typeface="Calibri" panose="020F0502020204030204" pitchFamily="34" charset="0"/>
+                        <a:ea typeface="Calibri" panose="020F0502020204030204" pitchFamily="34" charset="0"/>
+                        <a:cs typeface="Times New Roman" panose="02020603050405020304" pitchFamily="18" charset="0"/>
+                      </a:endParaRPr>
+                    </a:p>
+                  </a:txBody>
+                  <a:tcPr marL="68580" marR="68580" marT="0" marB="0"/>
+                </a:tc>
+                <a:extLst>
+                  <a:ext uri="{0D108BD9-81ED-4DB2-BD59-A6C34878D82A}">
+                    <a16:rowId xmlns:a16="http://schemas.microsoft.com/office/drawing/2014/main" val="3439955070"/>
+                  </a:ext>
+                </a:extLst>
+              </a:tr>
+              <a:tr h="256903">
+                <a:tc>
+                  <a:txBody>
+                    <a:bodyPr/>
+                    <a:lstStyle/>
+                    <a:p>
+                      <a:pPr>
+                        <a:lnSpc>
+                          <a:spcPct val="107000"/>
+                        </a:lnSpc>
+                        <a:spcAft>
+                          <a:spcPts val="800"/>
+                        </a:spcAft>
+                      </a:pPr>
+                      <a:r>
+                        <a:rPr lang="de-DE" sz="1200" dirty="0">
+                          <a:solidFill>
+                            <a:schemeClr val="tx1"/>
+                          </a:solidFill>
+                          <a:effectLst/>
+                        </a:rPr>
+                        <a:t>Fränk. Saale/Salz, Winter</a:t>
+                      </a:r>
+                      <a:endParaRPr lang="de-DE" sz="1100" dirty="0">
+                        <a:solidFill>
+                          <a:schemeClr val="tx1"/>
+                        </a:solidFill>
+                        <a:effectLst/>
+                        <a:latin typeface="Calibri" panose="020F0502020204030204" pitchFamily="34" charset="0"/>
+                        <a:ea typeface="Calibri" panose="020F0502020204030204" pitchFamily="34" charset="0"/>
+                        <a:cs typeface="Times New Roman" panose="02020603050405020304" pitchFamily="18" charset="0"/>
+                      </a:endParaRPr>
+                    </a:p>
+                  </a:txBody>
+                  <a:tcPr marL="68580" marR="68580" marT="0" marB="0"/>
+                </a:tc>
+                <a:tc>
+                  <a:txBody>
+                    <a:bodyPr/>
+                    <a:lstStyle/>
+                    <a:p>
+                      <a:pPr>
+                        <a:lnSpc>
+                          <a:spcPct val="107000"/>
+                        </a:lnSpc>
+                        <a:spcAft>
+                          <a:spcPts val="800"/>
+                        </a:spcAft>
+                      </a:pPr>
+                      <a:r>
+                        <a:rPr lang="de-DE" sz="1200">
+                          <a:effectLst/>
+                        </a:rPr>
+                        <a:t>5</a:t>
+                      </a:r>
+                      <a:endParaRPr lang="de-DE" sz="1100">
+                        <a:effectLst/>
+                        <a:latin typeface="Calibri" panose="020F0502020204030204" pitchFamily="34" charset="0"/>
+                        <a:ea typeface="Calibri" panose="020F0502020204030204" pitchFamily="34" charset="0"/>
+                        <a:cs typeface="Times New Roman" panose="02020603050405020304" pitchFamily="18" charset="0"/>
+                      </a:endParaRPr>
+                    </a:p>
+                  </a:txBody>
+                  <a:tcPr marL="68580" marR="68580" marT="0" marB="0"/>
+                </a:tc>
+                <a:tc>
+                  <a:txBody>
+                    <a:bodyPr/>
+                    <a:lstStyle/>
+                    <a:p>
+                      <a:pPr>
+                        <a:lnSpc>
+                          <a:spcPct val="107000"/>
+                        </a:lnSpc>
+                        <a:spcAft>
+                          <a:spcPts val="800"/>
+                        </a:spcAft>
+                      </a:pPr>
+                      <a:r>
+                        <a:rPr lang="de-DE" sz="1200" dirty="0">
+                          <a:effectLst/>
+                        </a:rPr>
+                        <a:t>1</a:t>
+                      </a:r>
+                      <a:endParaRPr lang="de-DE" sz="1100" dirty="0">
+                        <a:effectLst/>
+                        <a:latin typeface="Calibri" panose="020F0502020204030204" pitchFamily="34" charset="0"/>
+                        <a:ea typeface="Calibri" panose="020F0502020204030204" pitchFamily="34" charset="0"/>
+                        <a:cs typeface="Times New Roman" panose="02020603050405020304" pitchFamily="18" charset="0"/>
+                      </a:endParaRPr>
+                    </a:p>
+                  </a:txBody>
+                  <a:tcPr marL="68580" marR="68580" marT="0" marB="0"/>
+                </a:tc>
+                <a:extLst>
+                  <a:ext uri="{0D108BD9-81ED-4DB2-BD59-A6C34878D82A}">
+                    <a16:rowId xmlns:a16="http://schemas.microsoft.com/office/drawing/2014/main" val="1151582575"/>
+                  </a:ext>
+                </a:extLst>
+              </a:tr>
+              <a:tr h="256903">
+                <a:tc>
+                  <a:txBody>
+                    <a:bodyPr/>
+                    <a:lstStyle/>
+                    <a:p>
+                      <a:pPr>
+                        <a:lnSpc>
+                          <a:spcPct val="107000"/>
+                        </a:lnSpc>
+                        <a:spcAft>
+                          <a:spcPts val="800"/>
+                        </a:spcAft>
+                      </a:pPr>
+                      <a:r>
+                        <a:rPr lang="de-DE" sz="1200" dirty="0">
+                          <a:solidFill>
+                            <a:schemeClr val="tx1"/>
+                          </a:solidFill>
+                          <a:effectLst/>
+                        </a:rPr>
+                        <a:t>Fränk. Saale/Salz, Sommer</a:t>
+                      </a:r>
+                      <a:endParaRPr lang="de-DE" sz="1100" dirty="0">
+                        <a:solidFill>
+                          <a:schemeClr val="tx1"/>
+                        </a:solidFill>
+                        <a:effectLst/>
+                        <a:latin typeface="Calibri" panose="020F0502020204030204" pitchFamily="34" charset="0"/>
+                        <a:ea typeface="Calibri" panose="020F0502020204030204" pitchFamily="34" charset="0"/>
+                        <a:cs typeface="Times New Roman" panose="02020603050405020304" pitchFamily="18" charset="0"/>
+                      </a:endParaRPr>
+                    </a:p>
+                  </a:txBody>
+                  <a:tcPr marL="68580" marR="68580" marT="0" marB="0"/>
+                </a:tc>
+                <a:tc>
+                  <a:txBody>
+                    <a:bodyPr/>
+                    <a:lstStyle/>
+                    <a:p>
+                      <a:pPr>
+                        <a:lnSpc>
+                          <a:spcPct val="107000"/>
+                        </a:lnSpc>
+                        <a:spcAft>
+                          <a:spcPts val="800"/>
+                        </a:spcAft>
+                      </a:pPr>
+                      <a:r>
+                        <a:rPr lang="de-DE" sz="1200" dirty="0">
+                          <a:effectLst/>
+                        </a:rPr>
+                        <a:t>5</a:t>
+                      </a:r>
+                      <a:endParaRPr lang="de-DE" sz="1100" dirty="0">
+                        <a:effectLst/>
+                        <a:latin typeface="Calibri" panose="020F0502020204030204" pitchFamily="34" charset="0"/>
+                        <a:ea typeface="Calibri" panose="020F0502020204030204" pitchFamily="34" charset="0"/>
+                        <a:cs typeface="Times New Roman" panose="02020603050405020304" pitchFamily="18" charset="0"/>
+                      </a:endParaRPr>
+                    </a:p>
+                  </a:txBody>
+                  <a:tcPr marL="68580" marR="68580" marT="0" marB="0"/>
+                </a:tc>
+                <a:tc>
+                  <a:txBody>
+                    <a:bodyPr/>
+                    <a:lstStyle/>
+                    <a:p>
+                      <a:pPr>
+                        <a:lnSpc>
+                          <a:spcPct val="107000"/>
+                        </a:lnSpc>
+                        <a:spcAft>
+                          <a:spcPts val="800"/>
+                        </a:spcAft>
+                      </a:pPr>
+                      <a:r>
+                        <a:rPr lang="de-DE" sz="1200" dirty="0">
+                          <a:effectLst/>
+                        </a:rPr>
+                        <a:t>5</a:t>
+                      </a:r>
+                      <a:endParaRPr lang="de-DE" sz="1100" dirty="0">
+                        <a:effectLst/>
+                        <a:latin typeface="Calibri" panose="020F0502020204030204" pitchFamily="34" charset="0"/>
+                        <a:ea typeface="Calibri" panose="020F0502020204030204" pitchFamily="34" charset="0"/>
+                        <a:cs typeface="Times New Roman" panose="02020603050405020304" pitchFamily="18" charset="0"/>
+                      </a:endParaRPr>
+                    </a:p>
+                  </a:txBody>
+                  <a:tcPr marL="68580" marR="68580" marT="0" marB="0"/>
+                </a:tc>
+                <a:extLst>
+                  <a:ext uri="{0D108BD9-81ED-4DB2-BD59-A6C34878D82A}">
+                    <a16:rowId xmlns:a16="http://schemas.microsoft.com/office/drawing/2014/main" val="1443955996"/>
+                  </a:ext>
+                </a:extLst>
+              </a:tr>
+            </a:tbl>
+          </a:graphicData>
+        </a:graphic>
+      </p:graphicFrame>
+      <p:graphicFrame>
+        <p:nvGraphicFramePr>
+          <p:cNvPr id="6" name="Tabelle 5">
+            <a:extLst>
+              <a:ext uri="{FF2B5EF4-FFF2-40B4-BE49-F238E27FC236}">
+                <a16:creationId xmlns:a16="http://schemas.microsoft.com/office/drawing/2014/main" id="{3E35689A-80C9-077C-9512-42E20E4B29E3}"/>
+              </a:ext>
+            </a:extLst>
+          </p:cNvPr>
+          <p:cNvGraphicFramePr>
+            <a:graphicFrameLocks noGrp="1"/>
+          </p:cNvGraphicFramePr>
+          <p:nvPr>
+            <p:extLst>
+              <p:ext uri="{D42A27DB-BD31-4B8C-83A1-F6EECF244321}">
+                <p14:modId xmlns:p14="http://schemas.microsoft.com/office/powerpoint/2010/main" val="1107565615"/>
+              </p:ext>
+            </p:extLst>
+          </p:nvPr>
+        </p:nvGraphicFramePr>
+        <p:xfrm>
+          <a:off x="657014" y="3837475"/>
+          <a:ext cx="10833100" cy="2280031"/>
+        </p:xfrm>
+        <a:graphic>
+          <a:graphicData uri="http://schemas.openxmlformats.org/drawingml/2006/table">
+            <a:tbl>
+              <a:tblPr firstRow="1" firstCol="1" bandRow="1">
+                <a:tableStyleId>{5C22544A-7EE6-4342-B048-85BDC9FD1C3A}</a:tableStyleId>
+              </a:tblPr>
+              <a:tblGrid>
+                <a:gridCol w="2253086">
+                  <a:extLst>
+                    <a:ext uri="{9D8B030D-6E8A-4147-A177-3AD203B41FA5}">
+                      <a16:colId xmlns:a16="http://schemas.microsoft.com/office/drawing/2014/main" val="1389623767"/>
+                    </a:ext>
+                  </a:extLst>
+                </a:gridCol>
+                <a:gridCol w="742714">
+                  <a:extLst>
+                    <a:ext uri="{9D8B030D-6E8A-4147-A177-3AD203B41FA5}">
+                      <a16:colId xmlns:a16="http://schemas.microsoft.com/office/drawing/2014/main" val="967961759"/>
+                    </a:ext>
+                  </a:extLst>
+                </a:gridCol>
+                <a:gridCol w="986591">
+                  <a:extLst>
+                    <a:ext uri="{9D8B030D-6E8A-4147-A177-3AD203B41FA5}">
+                      <a16:colId xmlns:a16="http://schemas.microsoft.com/office/drawing/2014/main" val="341701426"/>
+                    </a:ext>
+                  </a:extLst>
+                </a:gridCol>
+                <a:gridCol w="1119614">
+                  <a:extLst>
+                    <a:ext uri="{9D8B030D-6E8A-4147-A177-3AD203B41FA5}">
+                      <a16:colId xmlns:a16="http://schemas.microsoft.com/office/drawing/2014/main" val="1930759727"/>
+                    </a:ext>
+                  </a:extLst>
+                </a:gridCol>
+                <a:gridCol w="1075273">
+                  <a:extLst>
+                    <a:ext uri="{9D8B030D-6E8A-4147-A177-3AD203B41FA5}">
+                      <a16:colId xmlns:a16="http://schemas.microsoft.com/office/drawing/2014/main" val="4248701422"/>
+                    </a:ext>
+                  </a:extLst>
+                </a:gridCol>
+                <a:gridCol w="1574111">
+                  <a:extLst>
+                    <a:ext uri="{9D8B030D-6E8A-4147-A177-3AD203B41FA5}">
+                      <a16:colId xmlns:a16="http://schemas.microsoft.com/office/drawing/2014/main" val="193125599"/>
+                    </a:ext>
+                  </a:extLst>
+                </a:gridCol>
+                <a:gridCol w="886824">
+                  <a:extLst>
+                    <a:ext uri="{9D8B030D-6E8A-4147-A177-3AD203B41FA5}">
+                      <a16:colId xmlns:a16="http://schemas.microsoft.com/office/drawing/2014/main" val="3112856550"/>
+                    </a:ext>
+                  </a:extLst>
+                </a:gridCol>
+                <a:gridCol w="1152870">
+                  <a:extLst>
+                    <a:ext uri="{9D8B030D-6E8A-4147-A177-3AD203B41FA5}">
+                      <a16:colId xmlns:a16="http://schemas.microsoft.com/office/drawing/2014/main" val="1712804261"/>
+                    </a:ext>
+                  </a:extLst>
+                </a:gridCol>
+                <a:gridCol w="1042017">
+                  <a:extLst>
+                    <a:ext uri="{9D8B030D-6E8A-4147-A177-3AD203B41FA5}">
+                      <a16:colId xmlns:a16="http://schemas.microsoft.com/office/drawing/2014/main" val="11964574"/>
+                    </a:ext>
+                  </a:extLst>
+                </a:gridCol>
+              </a:tblGrid>
+              <a:tr h="777571">
+                <a:tc>
+                  <a:txBody>
+                    <a:bodyPr/>
+                    <a:lstStyle/>
+                    <a:p>
+                      <a:pPr>
+                        <a:lnSpc>
+                          <a:spcPct val="107000"/>
+                        </a:lnSpc>
+                        <a:spcAft>
+                          <a:spcPts val="800"/>
+                        </a:spcAft>
+                      </a:pPr>
+                      <a:r>
+                        <a:rPr lang="de-DE" sz="1200" dirty="0">
+                          <a:effectLst/>
+                        </a:rPr>
+                        <a:t> </a:t>
+                      </a:r>
+                      <a:endParaRPr lang="de-DE" sz="1100" dirty="0">
+                        <a:effectLst/>
+                        <a:latin typeface="Calibri" panose="020F0502020204030204" pitchFamily="34" charset="0"/>
+                        <a:ea typeface="Calibri" panose="020F0502020204030204" pitchFamily="34" charset="0"/>
+                        <a:cs typeface="Times New Roman" panose="02020603050405020304" pitchFamily="18" charset="0"/>
+                      </a:endParaRPr>
+                    </a:p>
+                  </a:txBody>
+                  <a:tcPr marL="68580" marR="68580" marT="0" marB="0"/>
+                </a:tc>
+                <a:tc>
+                  <a:txBody>
+                    <a:bodyPr/>
+                    <a:lstStyle/>
+                    <a:p>
+                      <a:pPr>
+                        <a:lnSpc>
+                          <a:spcPct val="107000"/>
+                        </a:lnSpc>
+                        <a:spcAft>
+                          <a:spcPts val="800"/>
+                        </a:spcAft>
+                      </a:pPr>
+                      <a:r>
+                        <a:rPr lang="de-DE" sz="1200" dirty="0">
+                          <a:solidFill>
+                            <a:schemeClr val="tx1"/>
+                          </a:solidFill>
+                          <a:effectLst/>
+                        </a:rPr>
+                        <a:t>Nieder-schlag</a:t>
+                      </a:r>
+                      <a:endParaRPr lang="de-DE" sz="1100" dirty="0">
+                        <a:solidFill>
+                          <a:schemeClr val="tx1"/>
+                        </a:solidFill>
+                        <a:effectLst/>
+                        <a:latin typeface="Calibri" panose="020F0502020204030204" pitchFamily="34" charset="0"/>
+                        <a:ea typeface="Calibri" panose="020F0502020204030204" pitchFamily="34" charset="0"/>
+                        <a:cs typeface="Times New Roman" panose="02020603050405020304" pitchFamily="18" charset="0"/>
+                      </a:endParaRPr>
+                    </a:p>
+                  </a:txBody>
+                  <a:tcPr marL="68580" marR="68580" marT="0" marB="0"/>
+                </a:tc>
+                <a:tc>
+                  <a:txBody>
+                    <a:bodyPr/>
+                    <a:lstStyle/>
+                    <a:p>
+                      <a:pPr>
+                        <a:lnSpc>
+                          <a:spcPct val="107000"/>
+                        </a:lnSpc>
+                        <a:spcAft>
+                          <a:spcPts val="800"/>
+                        </a:spcAft>
+                      </a:pPr>
+                      <a:r>
+                        <a:rPr lang="de-DE" sz="1200" dirty="0">
+                          <a:solidFill>
+                            <a:schemeClr val="tx1"/>
+                          </a:solidFill>
+                          <a:effectLst/>
+                        </a:rPr>
+                        <a:t>Temperatur</a:t>
+                      </a:r>
+                      <a:endParaRPr lang="de-DE" sz="1100" dirty="0">
+                        <a:solidFill>
+                          <a:schemeClr val="tx1"/>
+                        </a:solidFill>
+                        <a:effectLst/>
+                        <a:latin typeface="Calibri" panose="020F0502020204030204" pitchFamily="34" charset="0"/>
+                        <a:ea typeface="Calibri" panose="020F0502020204030204" pitchFamily="34" charset="0"/>
+                        <a:cs typeface="Times New Roman" panose="02020603050405020304" pitchFamily="18" charset="0"/>
+                      </a:endParaRPr>
+                    </a:p>
+                  </a:txBody>
+                  <a:tcPr marL="68580" marR="68580" marT="0" marB="0"/>
+                </a:tc>
+                <a:tc>
+                  <a:txBody>
+                    <a:bodyPr/>
+                    <a:lstStyle/>
+                    <a:p>
+                      <a:pPr>
+                        <a:lnSpc>
+                          <a:spcPct val="107000"/>
+                        </a:lnSpc>
+                        <a:spcAft>
+                          <a:spcPts val="800"/>
+                        </a:spcAft>
+                      </a:pPr>
+                      <a:r>
+                        <a:rPr lang="de-DE" sz="1200" dirty="0">
+                          <a:solidFill>
+                            <a:schemeClr val="tx1"/>
+                          </a:solidFill>
+                          <a:effectLst/>
+                        </a:rPr>
+                        <a:t>Einfallende kurzwellige Strahlung</a:t>
+                      </a:r>
+                      <a:endParaRPr lang="de-DE" sz="1100" dirty="0">
+                        <a:solidFill>
+                          <a:schemeClr val="tx1"/>
+                        </a:solidFill>
+                        <a:effectLst/>
+                        <a:latin typeface="Calibri" panose="020F0502020204030204" pitchFamily="34" charset="0"/>
+                        <a:ea typeface="Calibri" panose="020F0502020204030204" pitchFamily="34" charset="0"/>
+                        <a:cs typeface="Times New Roman" panose="02020603050405020304" pitchFamily="18" charset="0"/>
+                      </a:endParaRPr>
+                    </a:p>
+                  </a:txBody>
+                  <a:tcPr marL="68580" marR="68580" marT="0" marB="0"/>
+                </a:tc>
+                <a:tc>
+                  <a:txBody>
+                    <a:bodyPr/>
+                    <a:lstStyle/>
+                    <a:p>
+                      <a:pPr>
+                        <a:lnSpc>
+                          <a:spcPct val="107000"/>
+                        </a:lnSpc>
+                        <a:spcAft>
+                          <a:spcPts val="800"/>
+                        </a:spcAft>
+                      </a:pPr>
+                      <a:r>
+                        <a:rPr lang="de-DE" sz="1200" dirty="0">
+                          <a:solidFill>
+                            <a:schemeClr val="tx1"/>
+                          </a:solidFill>
+                          <a:effectLst/>
+                        </a:rPr>
+                        <a:t>Relative Luftfeuchte</a:t>
+                      </a:r>
+                      <a:endParaRPr lang="de-DE" sz="1100" dirty="0">
+                        <a:solidFill>
+                          <a:schemeClr val="tx1"/>
+                        </a:solidFill>
+                        <a:effectLst/>
+                        <a:latin typeface="Calibri" panose="020F0502020204030204" pitchFamily="34" charset="0"/>
+                        <a:ea typeface="Calibri" panose="020F0502020204030204" pitchFamily="34" charset="0"/>
+                        <a:cs typeface="Times New Roman" panose="02020603050405020304" pitchFamily="18" charset="0"/>
+                      </a:endParaRPr>
+                    </a:p>
+                  </a:txBody>
+                  <a:tcPr marL="68580" marR="68580" marT="0" marB="0"/>
+                </a:tc>
+                <a:tc>
+                  <a:txBody>
+                    <a:bodyPr/>
+                    <a:lstStyle/>
+                    <a:p>
+                      <a:pPr>
+                        <a:lnSpc>
+                          <a:spcPct val="107000"/>
+                        </a:lnSpc>
+                        <a:spcAft>
+                          <a:spcPts val="800"/>
+                        </a:spcAft>
+                      </a:pPr>
+                      <a:r>
+                        <a:rPr lang="de-DE" sz="1200" dirty="0">
+                          <a:solidFill>
+                            <a:schemeClr val="tx1"/>
+                          </a:solidFill>
+                          <a:effectLst/>
+                        </a:rPr>
+                        <a:t>Oberflächennahe Bodenfeuchte</a:t>
+                      </a:r>
+                      <a:endParaRPr lang="de-DE" sz="1100" dirty="0">
+                        <a:solidFill>
+                          <a:schemeClr val="tx1"/>
+                        </a:solidFill>
+                        <a:effectLst/>
+                        <a:latin typeface="Calibri" panose="020F0502020204030204" pitchFamily="34" charset="0"/>
+                        <a:ea typeface="Calibri" panose="020F0502020204030204" pitchFamily="34" charset="0"/>
+                        <a:cs typeface="Times New Roman" panose="02020603050405020304" pitchFamily="18" charset="0"/>
+                      </a:endParaRPr>
+                    </a:p>
+                  </a:txBody>
+                  <a:tcPr marL="68580" marR="68580" marT="0" marB="0"/>
+                </a:tc>
+                <a:tc>
+                  <a:txBody>
+                    <a:bodyPr/>
+                    <a:lstStyle/>
+                    <a:p>
+                      <a:pPr>
+                        <a:lnSpc>
+                          <a:spcPct val="107000"/>
+                        </a:lnSpc>
+                        <a:spcAft>
+                          <a:spcPts val="800"/>
+                        </a:spcAft>
+                      </a:pPr>
+                      <a:r>
+                        <a:rPr lang="de-DE" sz="1200" dirty="0">
+                          <a:solidFill>
+                            <a:schemeClr val="tx1"/>
+                          </a:solidFill>
+                          <a:effectLst/>
+                        </a:rPr>
+                        <a:t>Schnee-speicher</a:t>
+                      </a:r>
+                      <a:endParaRPr lang="de-DE" sz="1100" dirty="0">
+                        <a:solidFill>
+                          <a:schemeClr val="tx1"/>
+                        </a:solidFill>
+                        <a:effectLst/>
+                        <a:latin typeface="Calibri" panose="020F0502020204030204" pitchFamily="34" charset="0"/>
+                        <a:ea typeface="Calibri" panose="020F0502020204030204" pitchFamily="34" charset="0"/>
+                        <a:cs typeface="Times New Roman" panose="02020603050405020304" pitchFamily="18" charset="0"/>
+                      </a:endParaRPr>
+                    </a:p>
+                  </a:txBody>
+                  <a:tcPr marL="68580" marR="68580" marT="0" marB="0"/>
+                </a:tc>
+                <a:tc>
+                  <a:txBody>
+                    <a:bodyPr/>
+                    <a:lstStyle/>
+                    <a:p>
+                      <a:pPr>
+                        <a:lnSpc>
+                          <a:spcPct val="107000"/>
+                        </a:lnSpc>
+                        <a:spcAft>
+                          <a:spcPts val="800"/>
+                        </a:spcAft>
+                      </a:pPr>
+                      <a:r>
+                        <a:rPr lang="de-DE" sz="1200" dirty="0">
+                          <a:solidFill>
+                            <a:schemeClr val="tx1"/>
+                          </a:solidFill>
+                          <a:effectLst/>
+                        </a:rPr>
+                        <a:t>Grundwasser-stand</a:t>
+                      </a:r>
+                      <a:endParaRPr lang="de-DE" sz="1100" dirty="0">
+                        <a:solidFill>
+                          <a:schemeClr val="tx1"/>
+                        </a:solidFill>
+                        <a:effectLst/>
+                        <a:latin typeface="Calibri" panose="020F0502020204030204" pitchFamily="34" charset="0"/>
+                        <a:ea typeface="Calibri" panose="020F0502020204030204" pitchFamily="34" charset="0"/>
+                        <a:cs typeface="Times New Roman" panose="02020603050405020304" pitchFamily="18" charset="0"/>
+                      </a:endParaRPr>
+                    </a:p>
+                  </a:txBody>
+                  <a:tcPr marL="68580" marR="68580" marT="0" marB="0"/>
+                </a:tc>
+                <a:tc>
+                  <a:txBody>
+                    <a:bodyPr/>
+                    <a:lstStyle/>
+                    <a:p>
+                      <a:pPr>
+                        <a:lnSpc>
+                          <a:spcPct val="107000"/>
+                        </a:lnSpc>
+                        <a:spcAft>
+                          <a:spcPts val="800"/>
+                        </a:spcAft>
+                      </a:pPr>
+                      <a:r>
+                        <a:rPr lang="de-DE" sz="1200" dirty="0">
+                          <a:solidFill>
+                            <a:schemeClr val="tx1"/>
+                          </a:solidFill>
+                          <a:effectLst/>
+                        </a:rPr>
+                        <a:t>Wasserleit-fähigkeit</a:t>
+                      </a:r>
+                      <a:endParaRPr lang="de-DE" sz="1100" dirty="0">
+                        <a:solidFill>
+                          <a:schemeClr val="tx1"/>
+                        </a:solidFill>
+                        <a:effectLst/>
+                        <a:latin typeface="Calibri" panose="020F0502020204030204" pitchFamily="34" charset="0"/>
+                        <a:ea typeface="Calibri" panose="020F0502020204030204" pitchFamily="34" charset="0"/>
+                        <a:cs typeface="Times New Roman" panose="02020603050405020304" pitchFamily="18" charset="0"/>
+                      </a:endParaRPr>
+                    </a:p>
+                  </a:txBody>
+                  <a:tcPr marL="68580" marR="68580" marT="0" marB="0"/>
+                </a:tc>
+                <a:extLst>
+                  <a:ext uri="{0D108BD9-81ED-4DB2-BD59-A6C34878D82A}">
+                    <a16:rowId xmlns:a16="http://schemas.microsoft.com/office/drawing/2014/main" val="3385655539"/>
+                  </a:ext>
+                </a:extLst>
+              </a:tr>
+              <a:tr h="250410">
+                <a:tc>
+                  <a:txBody>
+                    <a:bodyPr/>
+                    <a:lstStyle/>
+                    <a:p>
+                      <a:pPr>
+                        <a:lnSpc>
+                          <a:spcPct val="107000"/>
+                        </a:lnSpc>
+                        <a:spcAft>
+                          <a:spcPts val="800"/>
+                        </a:spcAft>
+                      </a:pPr>
+                      <a:r>
+                        <a:rPr lang="de-DE" sz="1200" dirty="0">
+                          <a:solidFill>
+                            <a:schemeClr val="tx1"/>
+                          </a:solidFill>
+                          <a:effectLst/>
+                        </a:rPr>
+                        <a:t>Isar/Mittenwald, Winter</a:t>
+                      </a:r>
+                      <a:endParaRPr lang="de-DE" sz="1100" dirty="0">
+                        <a:solidFill>
+                          <a:schemeClr val="tx1"/>
+                        </a:solidFill>
+                        <a:effectLst/>
+                        <a:latin typeface="Calibri" panose="020F0502020204030204" pitchFamily="34" charset="0"/>
+                        <a:ea typeface="Calibri" panose="020F0502020204030204" pitchFamily="34" charset="0"/>
+                        <a:cs typeface="Times New Roman" panose="02020603050405020304" pitchFamily="18" charset="0"/>
+                      </a:endParaRPr>
+                    </a:p>
+                  </a:txBody>
+                  <a:tcPr marL="68580" marR="68580" marT="0" marB="0"/>
+                </a:tc>
+                <a:tc>
+                  <a:txBody>
+                    <a:bodyPr/>
+                    <a:lstStyle/>
+                    <a:p>
+                      <a:pPr>
+                        <a:lnSpc>
+                          <a:spcPct val="107000"/>
+                        </a:lnSpc>
+                        <a:spcAft>
+                          <a:spcPts val="800"/>
+                        </a:spcAft>
+                      </a:pPr>
+                      <a:r>
+                        <a:rPr lang="de-DE" sz="1200">
+                          <a:effectLst/>
+                        </a:rPr>
+                        <a:t>1</a:t>
+                      </a:r>
+                      <a:endParaRPr lang="de-DE" sz="1100">
+                        <a:effectLst/>
+                        <a:latin typeface="Calibri" panose="020F0502020204030204" pitchFamily="34" charset="0"/>
+                        <a:ea typeface="Calibri" panose="020F0502020204030204" pitchFamily="34" charset="0"/>
+                        <a:cs typeface="Times New Roman" panose="02020603050405020304" pitchFamily="18" charset="0"/>
+                      </a:endParaRPr>
+                    </a:p>
+                  </a:txBody>
+                  <a:tcPr marL="68580" marR="68580" marT="0" marB="0"/>
+                </a:tc>
+                <a:tc>
+                  <a:txBody>
+                    <a:bodyPr/>
+                    <a:lstStyle/>
+                    <a:p>
+                      <a:pPr>
+                        <a:lnSpc>
+                          <a:spcPct val="107000"/>
+                        </a:lnSpc>
+                        <a:spcAft>
+                          <a:spcPts val="800"/>
+                        </a:spcAft>
+                      </a:pPr>
+                      <a:r>
+                        <a:rPr lang="de-DE" sz="1200">
+                          <a:effectLst/>
+                        </a:rPr>
+                        <a:t>5</a:t>
+                      </a:r>
+                      <a:endParaRPr lang="de-DE" sz="1100">
+                        <a:effectLst/>
+                        <a:latin typeface="Calibri" panose="020F0502020204030204" pitchFamily="34" charset="0"/>
+                        <a:ea typeface="Calibri" panose="020F0502020204030204" pitchFamily="34" charset="0"/>
+                        <a:cs typeface="Times New Roman" panose="02020603050405020304" pitchFamily="18" charset="0"/>
+                      </a:endParaRPr>
+                    </a:p>
+                  </a:txBody>
+                  <a:tcPr marL="68580" marR="68580" marT="0" marB="0"/>
+                </a:tc>
+                <a:tc>
+                  <a:txBody>
+                    <a:bodyPr/>
+                    <a:lstStyle/>
+                    <a:p>
+                      <a:pPr>
+                        <a:lnSpc>
+                          <a:spcPct val="107000"/>
+                        </a:lnSpc>
+                        <a:spcAft>
+                          <a:spcPts val="800"/>
+                        </a:spcAft>
+                      </a:pPr>
+                      <a:r>
+                        <a:rPr lang="de-DE" sz="1200">
+                          <a:effectLst/>
+                        </a:rPr>
+                        <a:t>7</a:t>
+                      </a:r>
+                      <a:endParaRPr lang="de-DE" sz="1100">
+                        <a:effectLst/>
+                        <a:latin typeface="Calibri" panose="020F0502020204030204" pitchFamily="34" charset="0"/>
+                        <a:ea typeface="Calibri" panose="020F0502020204030204" pitchFamily="34" charset="0"/>
+                        <a:cs typeface="Times New Roman" panose="02020603050405020304" pitchFamily="18" charset="0"/>
+                      </a:endParaRPr>
+                    </a:p>
+                  </a:txBody>
+                  <a:tcPr marL="68580" marR="68580" marT="0" marB="0"/>
+                </a:tc>
+                <a:tc>
+                  <a:txBody>
+                    <a:bodyPr/>
+                    <a:lstStyle/>
+                    <a:p>
+                      <a:pPr>
+                        <a:lnSpc>
+                          <a:spcPct val="107000"/>
+                        </a:lnSpc>
+                        <a:spcAft>
+                          <a:spcPts val="800"/>
+                        </a:spcAft>
+                      </a:pPr>
+                      <a:r>
+                        <a:rPr lang="de-DE" sz="1200">
+                          <a:effectLst/>
+                        </a:rPr>
+                        <a:t>3</a:t>
+                      </a:r>
+                      <a:endParaRPr lang="de-DE" sz="1100">
+                        <a:effectLst/>
+                        <a:latin typeface="Calibri" panose="020F0502020204030204" pitchFamily="34" charset="0"/>
+                        <a:ea typeface="Calibri" panose="020F0502020204030204" pitchFamily="34" charset="0"/>
+                        <a:cs typeface="Times New Roman" panose="02020603050405020304" pitchFamily="18" charset="0"/>
+                      </a:endParaRPr>
+                    </a:p>
+                  </a:txBody>
+                  <a:tcPr marL="68580" marR="68580" marT="0" marB="0"/>
+                </a:tc>
+                <a:tc>
+                  <a:txBody>
+                    <a:bodyPr/>
+                    <a:lstStyle/>
+                    <a:p>
+                      <a:pPr>
+                        <a:lnSpc>
+                          <a:spcPct val="107000"/>
+                        </a:lnSpc>
+                        <a:spcAft>
+                          <a:spcPts val="800"/>
+                        </a:spcAft>
+                      </a:pPr>
+                      <a:r>
+                        <a:rPr lang="de-DE" sz="1200">
+                          <a:effectLst/>
+                        </a:rPr>
+                        <a:t>2</a:t>
+                      </a:r>
+                      <a:endParaRPr lang="de-DE" sz="1100">
+                        <a:effectLst/>
+                        <a:latin typeface="Calibri" panose="020F0502020204030204" pitchFamily="34" charset="0"/>
+                        <a:ea typeface="Calibri" panose="020F0502020204030204" pitchFamily="34" charset="0"/>
+                        <a:cs typeface="Times New Roman" panose="02020603050405020304" pitchFamily="18" charset="0"/>
+                      </a:endParaRPr>
+                    </a:p>
+                  </a:txBody>
+                  <a:tcPr marL="68580" marR="68580" marT="0" marB="0"/>
+                </a:tc>
+                <a:tc>
+                  <a:txBody>
+                    <a:bodyPr/>
+                    <a:lstStyle/>
+                    <a:p>
+                      <a:pPr>
+                        <a:lnSpc>
+                          <a:spcPct val="107000"/>
+                        </a:lnSpc>
+                        <a:spcAft>
+                          <a:spcPts val="800"/>
+                        </a:spcAft>
+                      </a:pPr>
+                      <a:r>
+                        <a:rPr lang="de-DE" sz="1200">
+                          <a:effectLst/>
+                        </a:rPr>
+                        <a:t>3</a:t>
+                      </a:r>
+                      <a:endParaRPr lang="de-DE" sz="1100">
+                        <a:effectLst/>
+                        <a:latin typeface="Calibri" panose="020F0502020204030204" pitchFamily="34" charset="0"/>
+                        <a:ea typeface="Calibri" panose="020F0502020204030204" pitchFamily="34" charset="0"/>
+                        <a:cs typeface="Times New Roman" panose="02020603050405020304" pitchFamily="18" charset="0"/>
+                      </a:endParaRPr>
+                    </a:p>
+                  </a:txBody>
+                  <a:tcPr marL="68580" marR="68580" marT="0" marB="0"/>
+                </a:tc>
+                <a:tc>
+                  <a:txBody>
+                    <a:bodyPr/>
+                    <a:lstStyle/>
+                    <a:p>
+                      <a:pPr>
+                        <a:lnSpc>
+                          <a:spcPct val="107000"/>
+                        </a:lnSpc>
+                        <a:spcAft>
+                          <a:spcPts val="800"/>
+                        </a:spcAft>
+                      </a:pPr>
+                      <a:r>
+                        <a:rPr lang="de-DE" sz="1200">
+                          <a:effectLst/>
+                        </a:rPr>
+                        <a:t>1</a:t>
+                      </a:r>
+                      <a:endParaRPr lang="de-DE" sz="1100">
+                        <a:effectLst/>
+                        <a:latin typeface="Calibri" panose="020F0502020204030204" pitchFamily="34" charset="0"/>
+                        <a:ea typeface="Calibri" panose="020F0502020204030204" pitchFamily="34" charset="0"/>
+                        <a:cs typeface="Times New Roman" panose="02020603050405020304" pitchFamily="18" charset="0"/>
+                      </a:endParaRPr>
+                    </a:p>
+                  </a:txBody>
+                  <a:tcPr marL="68580" marR="68580" marT="0" marB="0"/>
+                </a:tc>
+                <a:tc>
+                  <a:txBody>
+                    <a:bodyPr/>
+                    <a:lstStyle/>
+                    <a:p>
+                      <a:pPr>
+                        <a:lnSpc>
+                          <a:spcPct val="107000"/>
+                        </a:lnSpc>
+                        <a:spcAft>
+                          <a:spcPts val="800"/>
+                        </a:spcAft>
+                      </a:pPr>
+                      <a:r>
+                        <a:rPr lang="de-DE" sz="1200">
+                          <a:effectLst/>
+                        </a:rPr>
+                        <a:t>6</a:t>
+                      </a:r>
+                      <a:endParaRPr lang="de-DE" sz="1100">
+                        <a:effectLst/>
+                        <a:latin typeface="Calibri" panose="020F0502020204030204" pitchFamily="34" charset="0"/>
+                        <a:ea typeface="Calibri" panose="020F0502020204030204" pitchFamily="34" charset="0"/>
+                        <a:cs typeface="Times New Roman" panose="02020603050405020304" pitchFamily="18" charset="0"/>
+                      </a:endParaRPr>
+                    </a:p>
+                  </a:txBody>
+                  <a:tcPr marL="68580" marR="68580" marT="0" marB="0"/>
+                </a:tc>
+                <a:extLst>
+                  <a:ext uri="{0D108BD9-81ED-4DB2-BD59-A6C34878D82A}">
+                    <a16:rowId xmlns:a16="http://schemas.microsoft.com/office/drawing/2014/main" val="4018212210"/>
+                  </a:ext>
+                </a:extLst>
+              </a:tr>
+              <a:tr h="250410">
+                <a:tc>
+                  <a:txBody>
+                    <a:bodyPr/>
+                    <a:lstStyle/>
+                    <a:p>
+                      <a:pPr>
+                        <a:lnSpc>
+                          <a:spcPct val="107000"/>
+                        </a:lnSpc>
+                        <a:spcAft>
+                          <a:spcPts val="800"/>
+                        </a:spcAft>
+                      </a:pPr>
+                      <a:r>
+                        <a:rPr lang="de-DE" sz="1200" dirty="0">
+                          <a:solidFill>
+                            <a:schemeClr val="tx1"/>
+                          </a:solidFill>
+                          <a:effectLst/>
+                        </a:rPr>
+                        <a:t>Isar/Mittenwald, Sommer</a:t>
+                      </a:r>
+                      <a:endParaRPr lang="de-DE" sz="1100" dirty="0">
+                        <a:solidFill>
+                          <a:schemeClr val="tx1"/>
+                        </a:solidFill>
+                        <a:effectLst/>
+                        <a:latin typeface="Calibri" panose="020F0502020204030204" pitchFamily="34" charset="0"/>
+                        <a:ea typeface="Calibri" panose="020F0502020204030204" pitchFamily="34" charset="0"/>
+                        <a:cs typeface="Times New Roman" panose="02020603050405020304" pitchFamily="18" charset="0"/>
+                      </a:endParaRPr>
+                    </a:p>
+                  </a:txBody>
+                  <a:tcPr marL="68580" marR="68580" marT="0" marB="0"/>
+                </a:tc>
+                <a:tc>
+                  <a:txBody>
+                    <a:bodyPr/>
+                    <a:lstStyle/>
+                    <a:p>
+                      <a:pPr>
+                        <a:lnSpc>
+                          <a:spcPct val="107000"/>
+                        </a:lnSpc>
+                        <a:spcAft>
+                          <a:spcPts val="800"/>
+                        </a:spcAft>
+                      </a:pPr>
+                      <a:r>
+                        <a:rPr lang="de-DE" sz="1200">
+                          <a:effectLst/>
+                        </a:rPr>
+                        <a:t>1</a:t>
+                      </a:r>
+                      <a:endParaRPr lang="de-DE" sz="1100">
+                        <a:effectLst/>
+                        <a:latin typeface="Calibri" panose="020F0502020204030204" pitchFamily="34" charset="0"/>
+                        <a:ea typeface="Calibri" panose="020F0502020204030204" pitchFamily="34" charset="0"/>
+                        <a:cs typeface="Times New Roman" panose="02020603050405020304" pitchFamily="18" charset="0"/>
+                      </a:endParaRPr>
+                    </a:p>
+                  </a:txBody>
+                  <a:tcPr marL="68580" marR="68580" marT="0" marB="0"/>
+                </a:tc>
+                <a:tc>
+                  <a:txBody>
+                    <a:bodyPr/>
+                    <a:lstStyle/>
+                    <a:p>
+                      <a:pPr>
+                        <a:lnSpc>
+                          <a:spcPct val="107000"/>
+                        </a:lnSpc>
+                        <a:spcAft>
+                          <a:spcPts val="800"/>
+                        </a:spcAft>
+                      </a:pPr>
+                      <a:r>
+                        <a:rPr lang="de-DE" sz="1200">
+                          <a:effectLst/>
+                        </a:rPr>
+                        <a:t>7</a:t>
+                      </a:r>
+                      <a:endParaRPr lang="de-DE" sz="1100">
+                        <a:effectLst/>
+                        <a:latin typeface="Calibri" panose="020F0502020204030204" pitchFamily="34" charset="0"/>
+                        <a:ea typeface="Calibri" panose="020F0502020204030204" pitchFamily="34" charset="0"/>
+                        <a:cs typeface="Times New Roman" panose="02020603050405020304" pitchFamily="18" charset="0"/>
+                      </a:endParaRPr>
+                    </a:p>
+                  </a:txBody>
+                  <a:tcPr marL="68580" marR="68580" marT="0" marB="0"/>
+                </a:tc>
+                <a:tc>
+                  <a:txBody>
+                    <a:bodyPr/>
+                    <a:lstStyle/>
+                    <a:p>
+                      <a:pPr>
+                        <a:lnSpc>
+                          <a:spcPct val="107000"/>
+                        </a:lnSpc>
+                        <a:spcAft>
+                          <a:spcPts val="800"/>
+                        </a:spcAft>
+                      </a:pPr>
+                      <a:r>
+                        <a:rPr lang="de-DE" sz="1200">
+                          <a:effectLst/>
+                        </a:rPr>
+                        <a:t>9</a:t>
+                      </a:r>
+                      <a:endParaRPr lang="de-DE" sz="1100">
+                        <a:effectLst/>
+                        <a:latin typeface="Calibri" panose="020F0502020204030204" pitchFamily="34" charset="0"/>
+                        <a:ea typeface="Calibri" panose="020F0502020204030204" pitchFamily="34" charset="0"/>
+                        <a:cs typeface="Times New Roman" panose="02020603050405020304" pitchFamily="18" charset="0"/>
+                      </a:endParaRPr>
+                    </a:p>
+                  </a:txBody>
+                  <a:tcPr marL="68580" marR="68580" marT="0" marB="0"/>
+                </a:tc>
+                <a:tc>
+                  <a:txBody>
+                    <a:bodyPr/>
+                    <a:lstStyle/>
+                    <a:p>
+                      <a:pPr>
+                        <a:lnSpc>
+                          <a:spcPct val="107000"/>
+                        </a:lnSpc>
+                        <a:spcAft>
+                          <a:spcPts val="800"/>
+                        </a:spcAft>
+                      </a:pPr>
+                      <a:r>
+                        <a:rPr lang="de-DE" sz="1200">
+                          <a:effectLst/>
+                        </a:rPr>
+                        <a:t>3</a:t>
+                      </a:r>
+                      <a:endParaRPr lang="de-DE" sz="1100">
+                        <a:effectLst/>
+                        <a:latin typeface="Calibri" panose="020F0502020204030204" pitchFamily="34" charset="0"/>
+                        <a:ea typeface="Calibri" panose="020F0502020204030204" pitchFamily="34" charset="0"/>
+                        <a:cs typeface="Times New Roman" panose="02020603050405020304" pitchFamily="18" charset="0"/>
+                      </a:endParaRPr>
+                    </a:p>
+                  </a:txBody>
+                  <a:tcPr marL="68580" marR="68580" marT="0" marB="0"/>
+                </a:tc>
+                <a:tc>
+                  <a:txBody>
+                    <a:bodyPr/>
+                    <a:lstStyle/>
+                    <a:p>
+                      <a:pPr>
+                        <a:lnSpc>
+                          <a:spcPct val="107000"/>
+                        </a:lnSpc>
+                        <a:spcAft>
+                          <a:spcPts val="800"/>
+                        </a:spcAft>
+                      </a:pPr>
+                      <a:r>
+                        <a:rPr lang="de-DE" sz="1200">
+                          <a:effectLst/>
+                        </a:rPr>
+                        <a:t>3</a:t>
+                      </a:r>
+                      <a:endParaRPr lang="de-DE" sz="1100">
+                        <a:effectLst/>
+                        <a:latin typeface="Calibri" panose="020F0502020204030204" pitchFamily="34" charset="0"/>
+                        <a:ea typeface="Calibri" panose="020F0502020204030204" pitchFamily="34" charset="0"/>
+                        <a:cs typeface="Times New Roman" panose="02020603050405020304" pitchFamily="18" charset="0"/>
+                      </a:endParaRPr>
+                    </a:p>
+                  </a:txBody>
+                  <a:tcPr marL="68580" marR="68580" marT="0" marB="0"/>
+                </a:tc>
+                <a:tc>
+                  <a:txBody>
+                    <a:bodyPr/>
+                    <a:lstStyle/>
+                    <a:p>
+                      <a:pPr>
+                        <a:lnSpc>
+                          <a:spcPct val="107000"/>
+                        </a:lnSpc>
+                        <a:spcAft>
+                          <a:spcPts val="800"/>
+                        </a:spcAft>
+                      </a:pPr>
+                      <a:r>
+                        <a:rPr lang="de-DE" sz="1200">
+                          <a:effectLst/>
+                        </a:rPr>
+                        <a:t>1</a:t>
+                      </a:r>
+                      <a:endParaRPr lang="de-DE" sz="1100">
+                        <a:effectLst/>
+                        <a:latin typeface="Calibri" panose="020F0502020204030204" pitchFamily="34" charset="0"/>
+                        <a:ea typeface="Calibri" panose="020F0502020204030204" pitchFamily="34" charset="0"/>
+                        <a:cs typeface="Times New Roman" panose="02020603050405020304" pitchFamily="18" charset="0"/>
+                      </a:endParaRPr>
+                    </a:p>
+                  </a:txBody>
+                  <a:tcPr marL="68580" marR="68580" marT="0" marB="0"/>
+                </a:tc>
+                <a:tc>
+                  <a:txBody>
+                    <a:bodyPr/>
+                    <a:lstStyle/>
+                    <a:p>
+                      <a:pPr>
+                        <a:lnSpc>
+                          <a:spcPct val="107000"/>
+                        </a:lnSpc>
+                        <a:spcAft>
+                          <a:spcPts val="800"/>
+                        </a:spcAft>
+                      </a:pPr>
+                      <a:r>
+                        <a:rPr lang="de-DE" sz="1200">
+                          <a:effectLst/>
+                        </a:rPr>
+                        <a:t>2</a:t>
+                      </a:r>
+                      <a:endParaRPr lang="de-DE" sz="1100">
+                        <a:effectLst/>
+                        <a:latin typeface="Calibri" panose="020F0502020204030204" pitchFamily="34" charset="0"/>
+                        <a:ea typeface="Calibri" panose="020F0502020204030204" pitchFamily="34" charset="0"/>
+                        <a:cs typeface="Times New Roman" panose="02020603050405020304" pitchFamily="18" charset="0"/>
+                      </a:endParaRPr>
+                    </a:p>
+                  </a:txBody>
+                  <a:tcPr marL="68580" marR="68580" marT="0" marB="0"/>
+                </a:tc>
+                <a:tc>
+                  <a:txBody>
+                    <a:bodyPr/>
+                    <a:lstStyle/>
+                    <a:p>
+                      <a:pPr>
+                        <a:lnSpc>
+                          <a:spcPct val="107000"/>
+                        </a:lnSpc>
+                        <a:spcAft>
+                          <a:spcPts val="800"/>
+                        </a:spcAft>
+                      </a:pPr>
+                      <a:r>
+                        <a:rPr lang="de-DE" sz="1200">
+                          <a:effectLst/>
+                        </a:rPr>
+                        <a:t>1</a:t>
+                      </a:r>
+                      <a:endParaRPr lang="de-DE" sz="1100">
+                        <a:effectLst/>
+                        <a:latin typeface="Calibri" panose="020F0502020204030204" pitchFamily="34" charset="0"/>
+                        <a:ea typeface="Calibri" panose="020F0502020204030204" pitchFamily="34" charset="0"/>
+                        <a:cs typeface="Times New Roman" panose="02020603050405020304" pitchFamily="18" charset="0"/>
+                      </a:endParaRPr>
+                    </a:p>
+                  </a:txBody>
+                  <a:tcPr marL="68580" marR="68580" marT="0" marB="0"/>
+                </a:tc>
+                <a:extLst>
+                  <a:ext uri="{0D108BD9-81ED-4DB2-BD59-A6C34878D82A}">
+                    <a16:rowId xmlns:a16="http://schemas.microsoft.com/office/drawing/2014/main" val="217261950"/>
+                  </a:ext>
+                </a:extLst>
+              </a:tr>
+              <a:tr h="250410">
+                <a:tc>
+                  <a:txBody>
+                    <a:bodyPr/>
+                    <a:lstStyle/>
+                    <a:p>
+                      <a:pPr>
+                        <a:lnSpc>
+                          <a:spcPct val="107000"/>
+                        </a:lnSpc>
+                        <a:spcAft>
+                          <a:spcPts val="800"/>
+                        </a:spcAft>
+                      </a:pPr>
+                      <a:r>
+                        <a:rPr lang="de-DE" sz="1200" dirty="0">
+                          <a:solidFill>
+                            <a:schemeClr val="tx1"/>
+                          </a:solidFill>
+                          <a:effectLst/>
+                        </a:rPr>
+                        <a:t>Iller/Kempten, Winter</a:t>
+                      </a:r>
+                      <a:endParaRPr lang="de-DE" sz="1100" dirty="0">
+                        <a:solidFill>
+                          <a:schemeClr val="tx1"/>
+                        </a:solidFill>
+                        <a:effectLst/>
+                        <a:latin typeface="Calibri" panose="020F0502020204030204" pitchFamily="34" charset="0"/>
+                        <a:ea typeface="Calibri" panose="020F0502020204030204" pitchFamily="34" charset="0"/>
+                        <a:cs typeface="Times New Roman" panose="02020603050405020304" pitchFamily="18" charset="0"/>
+                      </a:endParaRPr>
+                    </a:p>
+                  </a:txBody>
+                  <a:tcPr marL="68580" marR="68580" marT="0" marB="0"/>
+                </a:tc>
+                <a:tc>
+                  <a:txBody>
+                    <a:bodyPr/>
+                    <a:lstStyle/>
+                    <a:p>
+                      <a:pPr>
+                        <a:lnSpc>
+                          <a:spcPct val="107000"/>
+                        </a:lnSpc>
+                        <a:spcAft>
+                          <a:spcPts val="800"/>
+                        </a:spcAft>
+                      </a:pPr>
+                      <a:r>
+                        <a:rPr lang="de-DE" sz="1200">
+                          <a:effectLst/>
+                        </a:rPr>
+                        <a:t>1</a:t>
+                      </a:r>
+                      <a:endParaRPr lang="de-DE" sz="1100">
+                        <a:effectLst/>
+                        <a:latin typeface="Calibri" panose="020F0502020204030204" pitchFamily="34" charset="0"/>
+                        <a:ea typeface="Calibri" panose="020F0502020204030204" pitchFamily="34" charset="0"/>
+                        <a:cs typeface="Times New Roman" panose="02020603050405020304" pitchFamily="18" charset="0"/>
+                      </a:endParaRPr>
+                    </a:p>
+                  </a:txBody>
+                  <a:tcPr marL="68580" marR="68580" marT="0" marB="0"/>
+                </a:tc>
+                <a:tc>
+                  <a:txBody>
+                    <a:bodyPr/>
+                    <a:lstStyle/>
+                    <a:p>
+                      <a:pPr>
+                        <a:lnSpc>
+                          <a:spcPct val="107000"/>
+                        </a:lnSpc>
+                        <a:spcAft>
+                          <a:spcPts val="800"/>
+                        </a:spcAft>
+                      </a:pPr>
+                      <a:r>
+                        <a:rPr lang="de-DE" sz="1200">
+                          <a:effectLst/>
+                        </a:rPr>
+                        <a:t>5</a:t>
+                      </a:r>
+                      <a:endParaRPr lang="de-DE" sz="1100">
+                        <a:effectLst/>
+                        <a:latin typeface="Calibri" panose="020F0502020204030204" pitchFamily="34" charset="0"/>
+                        <a:ea typeface="Calibri" panose="020F0502020204030204" pitchFamily="34" charset="0"/>
+                        <a:cs typeface="Times New Roman" panose="02020603050405020304" pitchFamily="18" charset="0"/>
+                      </a:endParaRPr>
+                    </a:p>
+                  </a:txBody>
+                  <a:tcPr marL="68580" marR="68580" marT="0" marB="0"/>
+                </a:tc>
+                <a:tc>
+                  <a:txBody>
+                    <a:bodyPr/>
+                    <a:lstStyle/>
+                    <a:p>
+                      <a:pPr>
+                        <a:lnSpc>
+                          <a:spcPct val="107000"/>
+                        </a:lnSpc>
+                        <a:spcAft>
+                          <a:spcPts val="800"/>
+                        </a:spcAft>
+                      </a:pPr>
+                      <a:r>
+                        <a:rPr lang="de-DE" sz="1200">
+                          <a:effectLst/>
+                        </a:rPr>
+                        <a:t>7</a:t>
+                      </a:r>
+                      <a:endParaRPr lang="de-DE" sz="1100">
+                        <a:effectLst/>
+                        <a:latin typeface="Calibri" panose="020F0502020204030204" pitchFamily="34" charset="0"/>
+                        <a:ea typeface="Calibri" panose="020F0502020204030204" pitchFamily="34" charset="0"/>
+                        <a:cs typeface="Times New Roman" panose="02020603050405020304" pitchFamily="18" charset="0"/>
+                      </a:endParaRPr>
+                    </a:p>
+                  </a:txBody>
+                  <a:tcPr marL="68580" marR="68580" marT="0" marB="0"/>
+                </a:tc>
+                <a:tc>
+                  <a:txBody>
+                    <a:bodyPr/>
+                    <a:lstStyle/>
+                    <a:p>
+                      <a:pPr>
+                        <a:lnSpc>
+                          <a:spcPct val="107000"/>
+                        </a:lnSpc>
+                        <a:spcAft>
+                          <a:spcPts val="800"/>
+                        </a:spcAft>
+                      </a:pPr>
+                      <a:r>
+                        <a:rPr lang="de-DE" sz="1200">
+                          <a:effectLst/>
+                        </a:rPr>
+                        <a:t>3</a:t>
+                      </a:r>
+                      <a:endParaRPr lang="de-DE" sz="1100">
+                        <a:effectLst/>
+                        <a:latin typeface="Calibri" panose="020F0502020204030204" pitchFamily="34" charset="0"/>
+                        <a:ea typeface="Calibri" panose="020F0502020204030204" pitchFamily="34" charset="0"/>
+                        <a:cs typeface="Times New Roman" panose="02020603050405020304" pitchFamily="18" charset="0"/>
+                      </a:endParaRPr>
+                    </a:p>
+                  </a:txBody>
+                  <a:tcPr marL="68580" marR="68580" marT="0" marB="0"/>
+                </a:tc>
+                <a:tc>
+                  <a:txBody>
+                    <a:bodyPr/>
+                    <a:lstStyle/>
+                    <a:p>
+                      <a:pPr>
+                        <a:lnSpc>
+                          <a:spcPct val="107000"/>
+                        </a:lnSpc>
+                        <a:spcAft>
+                          <a:spcPts val="800"/>
+                        </a:spcAft>
+                      </a:pPr>
+                      <a:r>
+                        <a:rPr lang="de-DE" sz="1200">
+                          <a:effectLst/>
+                        </a:rPr>
+                        <a:t>3</a:t>
+                      </a:r>
+                      <a:endParaRPr lang="de-DE" sz="1100">
+                        <a:effectLst/>
+                        <a:latin typeface="Calibri" panose="020F0502020204030204" pitchFamily="34" charset="0"/>
+                        <a:ea typeface="Calibri" panose="020F0502020204030204" pitchFamily="34" charset="0"/>
+                        <a:cs typeface="Times New Roman" panose="02020603050405020304" pitchFamily="18" charset="0"/>
+                      </a:endParaRPr>
+                    </a:p>
+                  </a:txBody>
+                  <a:tcPr marL="68580" marR="68580" marT="0" marB="0"/>
+                </a:tc>
+                <a:tc>
+                  <a:txBody>
+                    <a:bodyPr/>
+                    <a:lstStyle/>
+                    <a:p>
+                      <a:pPr>
+                        <a:lnSpc>
+                          <a:spcPct val="107000"/>
+                        </a:lnSpc>
+                        <a:spcAft>
+                          <a:spcPts val="800"/>
+                        </a:spcAft>
+                      </a:pPr>
+                      <a:r>
+                        <a:rPr lang="de-DE" sz="1200">
+                          <a:effectLst/>
+                        </a:rPr>
+                        <a:t>4</a:t>
+                      </a:r>
+                      <a:endParaRPr lang="de-DE" sz="1100">
+                        <a:effectLst/>
+                        <a:latin typeface="Calibri" panose="020F0502020204030204" pitchFamily="34" charset="0"/>
+                        <a:ea typeface="Calibri" panose="020F0502020204030204" pitchFamily="34" charset="0"/>
+                        <a:cs typeface="Times New Roman" panose="02020603050405020304" pitchFamily="18" charset="0"/>
+                      </a:endParaRPr>
+                    </a:p>
+                  </a:txBody>
+                  <a:tcPr marL="68580" marR="68580" marT="0" marB="0"/>
+                </a:tc>
+                <a:tc>
+                  <a:txBody>
+                    <a:bodyPr/>
+                    <a:lstStyle/>
+                    <a:p>
+                      <a:pPr>
+                        <a:lnSpc>
+                          <a:spcPct val="107000"/>
+                        </a:lnSpc>
+                        <a:spcAft>
+                          <a:spcPts val="800"/>
+                        </a:spcAft>
+                      </a:pPr>
+                      <a:r>
+                        <a:rPr lang="de-DE" sz="1200">
+                          <a:effectLst/>
+                        </a:rPr>
+                        <a:t>3</a:t>
+                      </a:r>
+                      <a:endParaRPr lang="de-DE" sz="1100">
+                        <a:effectLst/>
+                        <a:latin typeface="Calibri" panose="020F0502020204030204" pitchFamily="34" charset="0"/>
+                        <a:ea typeface="Calibri" panose="020F0502020204030204" pitchFamily="34" charset="0"/>
+                        <a:cs typeface="Times New Roman" panose="02020603050405020304" pitchFamily="18" charset="0"/>
+                      </a:endParaRPr>
+                    </a:p>
+                  </a:txBody>
+                  <a:tcPr marL="68580" marR="68580" marT="0" marB="0"/>
+                </a:tc>
+                <a:tc>
+                  <a:txBody>
+                    <a:bodyPr/>
+                    <a:lstStyle/>
+                    <a:p>
+                      <a:pPr>
+                        <a:lnSpc>
+                          <a:spcPct val="107000"/>
+                        </a:lnSpc>
+                        <a:spcAft>
+                          <a:spcPts val="800"/>
+                        </a:spcAft>
+                      </a:pPr>
+                      <a:r>
+                        <a:rPr lang="de-DE" sz="1200">
+                          <a:effectLst/>
+                        </a:rPr>
+                        <a:t>3</a:t>
+                      </a:r>
+                      <a:endParaRPr lang="de-DE" sz="1100">
+                        <a:effectLst/>
+                        <a:latin typeface="Calibri" panose="020F0502020204030204" pitchFamily="34" charset="0"/>
+                        <a:ea typeface="Calibri" panose="020F0502020204030204" pitchFamily="34" charset="0"/>
+                        <a:cs typeface="Times New Roman" panose="02020603050405020304" pitchFamily="18" charset="0"/>
+                      </a:endParaRPr>
+                    </a:p>
+                  </a:txBody>
+                  <a:tcPr marL="68580" marR="68580" marT="0" marB="0"/>
+                </a:tc>
+                <a:extLst>
+                  <a:ext uri="{0D108BD9-81ED-4DB2-BD59-A6C34878D82A}">
+                    <a16:rowId xmlns:a16="http://schemas.microsoft.com/office/drawing/2014/main" val="3285411385"/>
+                  </a:ext>
+                </a:extLst>
+              </a:tr>
+              <a:tr h="250410">
+                <a:tc>
+                  <a:txBody>
+                    <a:bodyPr/>
+                    <a:lstStyle/>
+                    <a:p>
+                      <a:pPr>
+                        <a:lnSpc>
+                          <a:spcPct val="107000"/>
+                        </a:lnSpc>
+                        <a:spcAft>
+                          <a:spcPts val="800"/>
+                        </a:spcAft>
+                      </a:pPr>
+                      <a:r>
+                        <a:rPr lang="de-DE" sz="1200" dirty="0">
+                          <a:solidFill>
+                            <a:schemeClr val="tx1"/>
+                          </a:solidFill>
+                          <a:effectLst/>
+                        </a:rPr>
+                        <a:t>Iller/Kempten, Sommer</a:t>
+                      </a:r>
+                      <a:endParaRPr lang="de-DE" sz="1100" dirty="0">
+                        <a:solidFill>
+                          <a:schemeClr val="tx1"/>
+                        </a:solidFill>
+                        <a:effectLst/>
+                        <a:latin typeface="Calibri" panose="020F0502020204030204" pitchFamily="34" charset="0"/>
+                        <a:ea typeface="Calibri" panose="020F0502020204030204" pitchFamily="34" charset="0"/>
+                        <a:cs typeface="Times New Roman" panose="02020603050405020304" pitchFamily="18" charset="0"/>
+                      </a:endParaRPr>
+                    </a:p>
+                  </a:txBody>
+                  <a:tcPr marL="68580" marR="68580" marT="0" marB="0"/>
+                </a:tc>
+                <a:tc>
+                  <a:txBody>
+                    <a:bodyPr/>
+                    <a:lstStyle/>
+                    <a:p>
+                      <a:pPr>
+                        <a:lnSpc>
+                          <a:spcPct val="107000"/>
+                        </a:lnSpc>
+                        <a:spcAft>
+                          <a:spcPts val="800"/>
+                        </a:spcAft>
+                      </a:pPr>
+                      <a:r>
+                        <a:rPr lang="de-DE" sz="1200">
+                          <a:effectLst/>
+                        </a:rPr>
+                        <a:t>1</a:t>
+                      </a:r>
+                      <a:endParaRPr lang="de-DE" sz="1100">
+                        <a:effectLst/>
+                        <a:latin typeface="Calibri" panose="020F0502020204030204" pitchFamily="34" charset="0"/>
+                        <a:ea typeface="Calibri" panose="020F0502020204030204" pitchFamily="34" charset="0"/>
+                        <a:cs typeface="Times New Roman" panose="02020603050405020304" pitchFamily="18" charset="0"/>
+                      </a:endParaRPr>
+                    </a:p>
+                  </a:txBody>
+                  <a:tcPr marL="68580" marR="68580" marT="0" marB="0"/>
+                </a:tc>
+                <a:tc>
+                  <a:txBody>
+                    <a:bodyPr/>
+                    <a:lstStyle/>
+                    <a:p>
+                      <a:pPr>
+                        <a:lnSpc>
+                          <a:spcPct val="107000"/>
+                        </a:lnSpc>
+                        <a:spcAft>
+                          <a:spcPts val="800"/>
+                        </a:spcAft>
+                      </a:pPr>
+                      <a:r>
+                        <a:rPr lang="de-DE" sz="1200">
+                          <a:effectLst/>
+                        </a:rPr>
+                        <a:t>7</a:t>
+                      </a:r>
+                      <a:endParaRPr lang="de-DE" sz="1100">
+                        <a:effectLst/>
+                        <a:latin typeface="Calibri" panose="020F0502020204030204" pitchFamily="34" charset="0"/>
+                        <a:ea typeface="Calibri" panose="020F0502020204030204" pitchFamily="34" charset="0"/>
+                        <a:cs typeface="Times New Roman" panose="02020603050405020304" pitchFamily="18" charset="0"/>
+                      </a:endParaRPr>
+                    </a:p>
+                  </a:txBody>
+                  <a:tcPr marL="68580" marR="68580" marT="0" marB="0"/>
+                </a:tc>
+                <a:tc>
+                  <a:txBody>
+                    <a:bodyPr/>
+                    <a:lstStyle/>
+                    <a:p>
+                      <a:pPr>
+                        <a:lnSpc>
+                          <a:spcPct val="107000"/>
+                        </a:lnSpc>
+                        <a:spcAft>
+                          <a:spcPts val="800"/>
+                        </a:spcAft>
+                      </a:pPr>
+                      <a:r>
+                        <a:rPr lang="de-DE" sz="1200">
+                          <a:effectLst/>
+                        </a:rPr>
+                        <a:t>8</a:t>
+                      </a:r>
+                      <a:endParaRPr lang="de-DE" sz="1100">
+                        <a:effectLst/>
+                        <a:latin typeface="Calibri" panose="020F0502020204030204" pitchFamily="34" charset="0"/>
+                        <a:ea typeface="Calibri" panose="020F0502020204030204" pitchFamily="34" charset="0"/>
+                        <a:cs typeface="Times New Roman" panose="02020603050405020304" pitchFamily="18" charset="0"/>
+                      </a:endParaRPr>
+                    </a:p>
+                  </a:txBody>
+                  <a:tcPr marL="68580" marR="68580" marT="0" marB="0"/>
+                </a:tc>
+                <a:tc>
+                  <a:txBody>
+                    <a:bodyPr/>
+                    <a:lstStyle/>
+                    <a:p>
+                      <a:pPr>
+                        <a:lnSpc>
+                          <a:spcPct val="107000"/>
+                        </a:lnSpc>
+                        <a:spcAft>
+                          <a:spcPts val="800"/>
+                        </a:spcAft>
+                      </a:pPr>
+                      <a:r>
+                        <a:rPr lang="de-DE" sz="1200">
+                          <a:effectLst/>
+                        </a:rPr>
+                        <a:t>3</a:t>
+                      </a:r>
+                      <a:endParaRPr lang="de-DE" sz="1100">
+                        <a:effectLst/>
+                        <a:latin typeface="Calibri" panose="020F0502020204030204" pitchFamily="34" charset="0"/>
+                        <a:ea typeface="Calibri" panose="020F0502020204030204" pitchFamily="34" charset="0"/>
+                        <a:cs typeface="Times New Roman" panose="02020603050405020304" pitchFamily="18" charset="0"/>
+                      </a:endParaRPr>
+                    </a:p>
+                  </a:txBody>
+                  <a:tcPr marL="68580" marR="68580" marT="0" marB="0"/>
+                </a:tc>
+                <a:tc>
+                  <a:txBody>
+                    <a:bodyPr/>
+                    <a:lstStyle/>
+                    <a:p>
+                      <a:pPr>
+                        <a:lnSpc>
+                          <a:spcPct val="107000"/>
+                        </a:lnSpc>
+                        <a:spcAft>
+                          <a:spcPts val="800"/>
+                        </a:spcAft>
+                      </a:pPr>
+                      <a:r>
+                        <a:rPr lang="de-DE" sz="1200">
+                          <a:effectLst/>
+                        </a:rPr>
+                        <a:t>3</a:t>
+                      </a:r>
+                      <a:endParaRPr lang="de-DE" sz="1100">
+                        <a:effectLst/>
+                        <a:latin typeface="Calibri" panose="020F0502020204030204" pitchFamily="34" charset="0"/>
+                        <a:ea typeface="Calibri" panose="020F0502020204030204" pitchFamily="34" charset="0"/>
+                        <a:cs typeface="Times New Roman" panose="02020603050405020304" pitchFamily="18" charset="0"/>
+                      </a:endParaRPr>
+                    </a:p>
+                  </a:txBody>
+                  <a:tcPr marL="68580" marR="68580" marT="0" marB="0"/>
+                </a:tc>
+                <a:tc>
+                  <a:txBody>
+                    <a:bodyPr/>
+                    <a:lstStyle/>
+                    <a:p>
+                      <a:pPr>
+                        <a:lnSpc>
+                          <a:spcPct val="107000"/>
+                        </a:lnSpc>
+                        <a:spcAft>
+                          <a:spcPts val="800"/>
+                        </a:spcAft>
+                      </a:pPr>
+                      <a:r>
+                        <a:rPr lang="de-DE" sz="1200">
+                          <a:effectLst/>
+                        </a:rPr>
+                        <a:t>1</a:t>
+                      </a:r>
+                      <a:endParaRPr lang="de-DE" sz="1100">
+                        <a:effectLst/>
+                        <a:latin typeface="Calibri" panose="020F0502020204030204" pitchFamily="34" charset="0"/>
+                        <a:ea typeface="Calibri" panose="020F0502020204030204" pitchFamily="34" charset="0"/>
+                        <a:cs typeface="Times New Roman" panose="02020603050405020304" pitchFamily="18" charset="0"/>
+                      </a:endParaRPr>
+                    </a:p>
+                  </a:txBody>
+                  <a:tcPr marL="68580" marR="68580" marT="0" marB="0"/>
+                </a:tc>
+                <a:tc>
+                  <a:txBody>
+                    <a:bodyPr/>
+                    <a:lstStyle/>
+                    <a:p>
+                      <a:pPr>
+                        <a:lnSpc>
+                          <a:spcPct val="107000"/>
+                        </a:lnSpc>
+                        <a:spcAft>
+                          <a:spcPts val="800"/>
+                        </a:spcAft>
+                      </a:pPr>
+                      <a:r>
+                        <a:rPr lang="de-DE" sz="1200">
+                          <a:effectLst/>
+                        </a:rPr>
+                        <a:t>5</a:t>
+                      </a:r>
+                      <a:endParaRPr lang="de-DE" sz="1100">
+                        <a:effectLst/>
+                        <a:latin typeface="Calibri" panose="020F0502020204030204" pitchFamily="34" charset="0"/>
+                        <a:ea typeface="Calibri" panose="020F0502020204030204" pitchFamily="34" charset="0"/>
+                        <a:cs typeface="Times New Roman" panose="02020603050405020304" pitchFamily="18" charset="0"/>
+                      </a:endParaRPr>
+                    </a:p>
+                  </a:txBody>
+                  <a:tcPr marL="68580" marR="68580" marT="0" marB="0"/>
+                </a:tc>
+                <a:tc>
+                  <a:txBody>
+                    <a:bodyPr/>
+                    <a:lstStyle/>
+                    <a:p>
+                      <a:pPr>
+                        <a:lnSpc>
+                          <a:spcPct val="107000"/>
+                        </a:lnSpc>
+                        <a:spcAft>
+                          <a:spcPts val="800"/>
+                        </a:spcAft>
+                      </a:pPr>
+                      <a:r>
+                        <a:rPr lang="de-DE" sz="1200">
+                          <a:effectLst/>
+                        </a:rPr>
+                        <a:t>1</a:t>
+                      </a:r>
+                      <a:endParaRPr lang="de-DE" sz="1100">
+                        <a:effectLst/>
+                        <a:latin typeface="Calibri" panose="020F0502020204030204" pitchFamily="34" charset="0"/>
+                        <a:ea typeface="Calibri" panose="020F0502020204030204" pitchFamily="34" charset="0"/>
+                        <a:cs typeface="Times New Roman" panose="02020603050405020304" pitchFamily="18" charset="0"/>
+                      </a:endParaRPr>
+                    </a:p>
+                  </a:txBody>
+                  <a:tcPr marL="68580" marR="68580" marT="0" marB="0"/>
+                </a:tc>
+                <a:extLst>
+                  <a:ext uri="{0D108BD9-81ED-4DB2-BD59-A6C34878D82A}">
+                    <a16:rowId xmlns:a16="http://schemas.microsoft.com/office/drawing/2014/main" val="1916948048"/>
+                  </a:ext>
+                </a:extLst>
+              </a:tr>
+              <a:tr h="250410">
+                <a:tc>
+                  <a:txBody>
+                    <a:bodyPr/>
+                    <a:lstStyle/>
+                    <a:p>
+                      <a:pPr>
+                        <a:lnSpc>
+                          <a:spcPct val="107000"/>
+                        </a:lnSpc>
+                        <a:spcAft>
+                          <a:spcPts val="800"/>
+                        </a:spcAft>
+                      </a:pPr>
+                      <a:r>
+                        <a:rPr lang="de-DE" sz="1200" dirty="0">
+                          <a:solidFill>
+                            <a:schemeClr val="tx1"/>
+                          </a:solidFill>
+                          <a:effectLst/>
+                        </a:rPr>
+                        <a:t>Fränk. Saale/Salz, Winter</a:t>
+                      </a:r>
+                      <a:endParaRPr lang="de-DE" sz="1100" dirty="0">
+                        <a:solidFill>
+                          <a:schemeClr val="tx1"/>
+                        </a:solidFill>
+                        <a:effectLst/>
+                        <a:latin typeface="Calibri" panose="020F0502020204030204" pitchFamily="34" charset="0"/>
+                        <a:ea typeface="Calibri" panose="020F0502020204030204" pitchFamily="34" charset="0"/>
+                        <a:cs typeface="Times New Roman" panose="02020603050405020304" pitchFamily="18" charset="0"/>
+                      </a:endParaRPr>
+                    </a:p>
+                  </a:txBody>
+                  <a:tcPr marL="68580" marR="68580" marT="0" marB="0"/>
+                </a:tc>
+                <a:tc>
+                  <a:txBody>
+                    <a:bodyPr/>
+                    <a:lstStyle/>
+                    <a:p>
+                      <a:pPr>
+                        <a:lnSpc>
+                          <a:spcPct val="107000"/>
+                        </a:lnSpc>
+                        <a:spcAft>
+                          <a:spcPts val="800"/>
+                        </a:spcAft>
+                      </a:pPr>
+                      <a:r>
+                        <a:rPr lang="de-DE" sz="1200">
+                          <a:effectLst/>
+                        </a:rPr>
+                        <a:t>2</a:t>
+                      </a:r>
+                      <a:endParaRPr lang="de-DE" sz="1100">
+                        <a:effectLst/>
+                        <a:latin typeface="Calibri" panose="020F0502020204030204" pitchFamily="34" charset="0"/>
+                        <a:ea typeface="Calibri" panose="020F0502020204030204" pitchFamily="34" charset="0"/>
+                        <a:cs typeface="Times New Roman" panose="02020603050405020304" pitchFamily="18" charset="0"/>
+                      </a:endParaRPr>
+                    </a:p>
+                  </a:txBody>
+                  <a:tcPr marL="68580" marR="68580" marT="0" marB="0"/>
+                </a:tc>
+                <a:tc>
+                  <a:txBody>
+                    <a:bodyPr/>
+                    <a:lstStyle/>
+                    <a:p>
+                      <a:pPr>
+                        <a:lnSpc>
+                          <a:spcPct val="107000"/>
+                        </a:lnSpc>
+                        <a:spcAft>
+                          <a:spcPts val="800"/>
+                        </a:spcAft>
+                      </a:pPr>
+                      <a:r>
+                        <a:rPr lang="de-DE" sz="1200">
+                          <a:effectLst/>
+                        </a:rPr>
+                        <a:t>5</a:t>
+                      </a:r>
+                      <a:endParaRPr lang="de-DE" sz="1100">
+                        <a:effectLst/>
+                        <a:latin typeface="Calibri" panose="020F0502020204030204" pitchFamily="34" charset="0"/>
+                        <a:ea typeface="Calibri" panose="020F0502020204030204" pitchFamily="34" charset="0"/>
+                        <a:cs typeface="Times New Roman" panose="02020603050405020304" pitchFamily="18" charset="0"/>
+                      </a:endParaRPr>
+                    </a:p>
+                  </a:txBody>
+                  <a:tcPr marL="68580" marR="68580" marT="0" marB="0"/>
+                </a:tc>
+                <a:tc>
+                  <a:txBody>
+                    <a:bodyPr/>
+                    <a:lstStyle/>
+                    <a:p>
+                      <a:pPr>
+                        <a:lnSpc>
+                          <a:spcPct val="107000"/>
+                        </a:lnSpc>
+                        <a:spcAft>
+                          <a:spcPts val="800"/>
+                        </a:spcAft>
+                      </a:pPr>
+                      <a:r>
+                        <a:rPr lang="de-DE" sz="1200">
+                          <a:effectLst/>
+                        </a:rPr>
+                        <a:t>6</a:t>
+                      </a:r>
+                      <a:endParaRPr lang="de-DE" sz="1100">
+                        <a:effectLst/>
+                        <a:latin typeface="Calibri" panose="020F0502020204030204" pitchFamily="34" charset="0"/>
+                        <a:ea typeface="Calibri" panose="020F0502020204030204" pitchFamily="34" charset="0"/>
+                        <a:cs typeface="Times New Roman" panose="02020603050405020304" pitchFamily="18" charset="0"/>
+                      </a:endParaRPr>
+                    </a:p>
+                  </a:txBody>
+                  <a:tcPr marL="68580" marR="68580" marT="0" marB="0"/>
+                </a:tc>
+                <a:tc>
+                  <a:txBody>
+                    <a:bodyPr/>
+                    <a:lstStyle/>
+                    <a:p>
+                      <a:pPr>
+                        <a:lnSpc>
+                          <a:spcPct val="107000"/>
+                        </a:lnSpc>
+                        <a:spcAft>
+                          <a:spcPts val="800"/>
+                        </a:spcAft>
+                      </a:pPr>
+                      <a:r>
+                        <a:rPr lang="de-DE" sz="1200">
+                          <a:effectLst/>
+                        </a:rPr>
+                        <a:t>5</a:t>
+                      </a:r>
+                      <a:endParaRPr lang="de-DE" sz="1100">
+                        <a:effectLst/>
+                        <a:latin typeface="Calibri" panose="020F0502020204030204" pitchFamily="34" charset="0"/>
+                        <a:ea typeface="Calibri" panose="020F0502020204030204" pitchFamily="34" charset="0"/>
+                        <a:cs typeface="Times New Roman" panose="02020603050405020304" pitchFamily="18" charset="0"/>
+                      </a:endParaRPr>
+                    </a:p>
+                  </a:txBody>
+                  <a:tcPr marL="68580" marR="68580" marT="0" marB="0"/>
+                </a:tc>
+                <a:tc>
+                  <a:txBody>
+                    <a:bodyPr/>
+                    <a:lstStyle/>
+                    <a:p>
+                      <a:pPr>
+                        <a:lnSpc>
+                          <a:spcPct val="107000"/>
+                        </a:lnSpc>
+                        <a:spcAft>
+                          <a:spcPts val="800"/>
+                        </a:spcAft>
+                      </a:pPr>
+                      <a:r>
+                        <a:rPr lang="de-DE" sz="1200">
+                          <a:effectLst/>
+                        </a:rPr>
+                        <a:t>2</a:t>
+                      </a:r>
+                      <a:endParaRPr lang="de-DE" sz="1100">
+                        <a:effectLst/>
+                        <a:latin typeface="Calibri" panose="020F0502020204030204" pitchFamily="34" charset="0"/>
+                        <a:ea typeface="Calibri" panose="020F0502020204030204" pitchFamily="34" charset="0"/>
+                        <a:cs typeface="Times New Roman" panose="02020603050405020304" pitchFamily="18" charset="0"/>
+                      </a:endParaRPr>
+                    </a:p>
+                  </a:txBody>
+                  <a:tcPr marL="68580" marR="68580" marT="0" marB="0"/>
+                </a:tc>
+                <a:tc>
+                  <a:txBody>
+                    <a:bodyPr/>
+                    <a:lstStyle/>
+                    <a:p>
+                      <a:pPr>
+                        <a:lnSpc>
+                          <a:spcPct val="107000"/>
+                        </a:lnSpc>
+                        <a:spcAft>
+                          <a:spcPts val="800"/>
+                        </a:spcAft>
+                      </a:pPr>
+                      <a:r>
+                        <a:rPr lang="de-DE" sz="1200">
+                          <a:effectLst/>
+                        </a:rPr>
+                        <a:t>3</a:t>
+                      </a:r>
+                      <a:endParaRPr lang="de-DE" sz="1100">
+                        <a:effectLst/>
+                        <a:latin typeface="Calibri" panose="020F0502020204030204" pitchFamily="34" charset="0"/>
+                        <a:ea typeface="Calibri" panose="020F0502020204030204" pitchFamily="34" charset="0"/>
+                        <a:cs typeface="Times New Roman" panose="02020603050405020304" pitchFamily="18" charset="0"/>
+                      </a:endParaRPr>
+                    </a:p>
+                  </a:txBody>
+                  <a:tcPr marL="68580" marR="68580" marT="0" marB="0"/>
+                </a:tc>
+                <a:tc>
+                  <a:txBody>
+                    <a:bodyPr/>
+                    <a:lstStyle/>
+                    <a:p>
+                      <a:pPr>
+                        <a:lnSpc>
+                          <a:spcPct val="107000"/>
+                        </a:lnSpc>
+                        <a:spcAft>
+                          <a:spcPts val="800"/>
+                        </a:spcAft>
+                      </a:pPr>
+                      <a:r>
+                        <a:rPr lang="de-DE" sz="1200">
+                          <a:effectLst/>
+                        </a:rPr>
+                        <a:t>1</a:t>
+                      </a:r>
+                      <a:endParaRPr lang="de-DE" sz="1100">
+                        <a:effectLst/>
+                        <a:latin typeface="Calibri" panose="020F0502020204030204" pitchFamily="34" charset="0"/>
+                        <a:ea typeface="Calibri" panose="020F0502020204030204" pitchFamily="34" charset="0"/>
+                        <a:cs typeface="Times New Roman" panose="02020603050405020304" pitchFamily="18" charset="0"/>
+                      </a:endParaRPr>
+                    </a:p>
+                  </a:txBody>
+                  <a:tcPr marL="68580" marR="68580" marT="0" marB="0"/>
+                </a:tc>
+                <a:tc>
+                  <a:txBody>
+                    <a:bodyPr/>
+                    <a:lstStyle/>
+                    <a:p>
+                      <a:pPr>
+                        <a:lnSpc>
+                          <a:spcPct val="107000"/>
+                        </a:lnSpc>
+                        <a:spcAft>
+                          <a:spcPts val="800"/>
+                        </a:spcAft>
+                      </a:pPr>
+                      <a:r>
+                        <a:rPr lang="de-DE" sz="1200">
+                          <a:effectLst/>
+                        </a:rPr>
+                        <a:t>2</a:t>
+                      </a:r>
+                      <a:endParaRPr lang="de-DE" sz="1100">
+                        <a:effectLst/>
+                        <a:latin typeface="Calibri" panose="020F0502020204030204" pitchFamily="34" charset="0"/>
+                        <a:ea typeface="Calibri" panose="020F0502020204030204" pitchFamily="34" charset="0"/>
+                        <a:cs typeface="Times New Roman" panose="02020603050405020304" pitchFamily="18" charset="0"/>
+                      </a:endParaRPr>
+                    </a:p>
+                  </a:txBody>
+                  <a:tcPr marL="68580" marR="68580" marT="0" marB="0"/>
+                </a:tc>
+                <a:extLst>
+                  <a:ext uri="{0D108BD9-81ED-4DB2-BD59-A6C34878D82A}">
+                    <a16:rowId xmlns:a16="http://schemas.microsoft.com/office/drawing/2014/main" val="1425024726"/>
+                  </a:ext>
+                </a:extLst>
+              </a:tr>
+              <a:tr h="250410">
+                <a:tc>
+                  <a:txBody>
+                    <a:bodyPr/>
+                    <a:lstStyle/>
+                    <a:p>
+                      <a:pPr>
+                        <a:lnSpc>
+                          <a:spcPct val="107000"/>
+                        </a:lnSpc>
+                        <a:spcAft>
+                          <a:spcPts val="800"/>
+                        </a:spcAft>
+                      </a:pPr>
+                      <a:r>
+                        <a:rPr lang="de-DE" sz="1200" dirty="0">
+                          <a:solidFill>
+                            <a:schemeClr val="tx1"/>
+                          </a:solidFill>
+                          <a:effectLst/>
+                        </a:rPr>
+                        <a:t>Fränk. Saale/Salz, Sommer</a:t>
+                      </a:r>
+                      <a:endParaRPr lang="de-DE" sz="1100" dirty="0">
+                        <a:effectLst/>
+                        <a:latin typeface="Calibri" panose="020F0502020204030204" pitchFamily="34" charset="0"/>
+                        <a:ea typeface="Calibri" panose="020F0502020204030204" pitchFamily="34" charset="0"/>
+                        <a:cs typeface="Times New Roman" panose="02020603050405020304" pitchFamily="18" charset="0"/>
+                      </a:endParaRPr>
+                    </a:p>
+                  </a:txBody>
+                  <a:tcPr marL="68580" marR="68580" marT="0" marB="0"/>
+                </a:tc>
+                <a:tc>
+                  <a:txBody>
+                    <a:bodyPr/>
+                    <a:lstStyle/>
+                    <a:p>
+                      <a:pPr>
+                        <a:lnSpc>
+                          <a:spcPct val="107000"/>
+                        </a:lnSpc>
+                        <a:spcAft>
+                          <a:spcPts val="800"/>
+                        </a:spcAft>
+                      </a:pPr>
+                      <a:r>
+                        <a:rPr lang="de-DE" sz="1200">
+                          <a:effectLst/>
+                        </a:rPr>
+                        <a:t>1</a:t>
+                      </a:r>
+                      <a:endParaRPr lang="de-DE" sz="1100">
+                        <a:effectLst/>
+                        <a:latin typeface="Calibri" panose="020F0502020204030204" pitchFamily="34" charset="0"/>
+                        <a:ea typeface="Calibri" panose="020F0502020204030204" pitchFamily="34" charset="0"/>
+                        <a:cs typeface="Times New Roman" panose="02020603050405020304" pitchFamily="18" charset="0"/>
+                      </a:endParaRPr>
+                    </a:p>
+                  </a:txBody>
+                  <a:tcPr marL="68580" marR="68580" marT="0" marB="0"/>
+                </a:tc>
+                <a:tc>
+                  <a:txBody>
+                    <a:bodyPr/>
+                    <a:lstStyle/>
+                    <a:p>
+                      <a:pPr>
+                        <a:lnSpc>
+                          <a:spcPct val="107000"/>
+                        </a:lnSpc>
+                        <a:spcAft>
+                          <a:spcPts val="800"/>
+                        </a:spcAft>
+                      </a:pPr>
+                      <a:r>
+                        <a:rPr lang="de-DE" sz="1200">
+                          <a:effectLst/>
+                        </a:rPr>
+                        <a:t>6</a:t>
+                      </a:r>
+                      <a:endParaRPr lang="de-DE" sz="1100">
+                        <a:effectLst/>
+                        <a:latin typeface="Calibri" panose="020F0502020204030204" pitchFamily="34" charset="0"/>
+                        <a:ea typeface="Calibri" panose="020F0502020204030204" pitchFamily="34" charset="0"/>
+                        <a:cs typeface="Times New Roman" panose="02020603050405020304" pitchFamily="18" charset="0"/>
+                      </a:endParaRPr>
+                    </a:p>
+                  </a:txBody>
+                  <a:tcPr marL="68580" marR="68580" marT="0" marB="0"/>
+                </a:tc>
+                <a:tc>
+                  <a:txBody>
+                    <a:bodyPr/>
+                    <a:lstStyle/>
+                    <a:p>
+                      <a:pPr>
+                        <a:lnSpc>
+                          <a:spcPct val="107000"/>
+                        </a:lnSpc>
+                        <a:spcAft>
+                          <a:spcPts val="800"/>
+                        </a:spcAft>
+                      </a:pPr>
+                      <a:r>
+                        <a:rPr lang="de-DE" sz="1200">
+                          <a:effectLst/>
+                        </a:rPr>
+                        <a:t>7</a:t>
+                      </a:r>
+                      <a:endParaRPr lang="de-DE" sz="1100">
+                        <a:effectLst/>
+                        <a:latin typeface="Calibri" panose="020F0502020204030204" pitchFamily="34" charset="0"/>
+                        <a:ea typeface="Calibri" panose="020F0502020204030204" pitchFamily="34" charset="0"/>
+                        <a:cs typeface="Times New Roman" panose="02020603050405020304" pitchFamily="18" charset="0"/>
+                      </a:endParaRPr>
+                    </a:p>
+                  </a:txBody>
+                  <a:tcPr marL="68580" marR="68580" marT="0" marB="0"/>
+                </a:tc>
+                <a:tc>
+                  <a:txBody>
+                    <a:bodyPr/>
+                    <a:lstStyle/>
+                    <a:p>
+                      <a:pPr>
+                        <a:lnSpc>
+                          <a:spcPct val="107000"/>
+                        </a:lnSpc>
+                        <a:spcAft>
+                          <a:spcPts val="800"/>
+                        </a:spcAft>
+                      </a:pPr>
+                      <a:r>
+                        <a:rPr lang="de-DE" sz="1200">
+                          <a:effectLst/>
+                        </a:rPr>
+                        <a:t>4</a:t>
+                      </a:r>
+                      <a:endParaRPr lang="de-DE" sz="1100">
+                        <a:effectLst/>
+                        <a:latin typeface="Calibri" panose="020F0502020204030204" pitchFamily="34" charset="0"/>
+                        <a:ea typeface="Calibri" panose="020F0502020204030204" pitchFamily="34" charset="0"/>
+                        <a:cs typeface="Times New Roman" panose="02020603050405020304" pitchFamily="18" charset="0"/>
+                      </a:endParaRPr>
+                    </a:p>
+                  </a:txBody>
+                  <a:tcPr marL="68580" marR="68580" marT="0" marB="0"/>
+                </a:tc>
+                <a:tc>
+                  <a:txBody>
+                    <a:bodyPr/>
+                    <a:lstStyle/>
+                    <a:p>
+                      <a:pPr>
+                        <a:lnSpc>
+                          <a:spcPct val="107000"/>
+                        </a:lnSpc>
+                        <a:spcAft>
+                          <a:spcPts val="800"/>
+                        </a:spcAft>
+                      </a:pPr>
+                      <a:r>
+                        <a:rPr lang="de-DE" sz="1200">
+                          <a:effectLst/>
+                        </a:rPr>
+                        <a:t>2</a:t>
+                      </a:r>
+                      <a:endParaRPr lang="de-DE" sz="1100">
+                        <a:effectLst/>
+                        <a:latin typeface="Calibri" panose="020F0502020204030204" pitchFamily="34" charset="0"/>
+                        <a:ea typeface="Calibri" panose="020F0502020204030204" pitchFamily="34" charset="0"/>
+                        <a:cs typeface="Times New Roman" panose="02020603050405020304" pitchFamily="18" charset="0"/>
+                      </a:endParaRPr>
+                    </a:p>
+                  </a:txBody>
+                  <a:tcPr marL="68580" marR="68580" marT="0" marB="0"/>
+                </a:tc>
+                <a:tc>
+                  <a:txBody>
+                    <a:bodyPr/>
+                    <a:lstStyle/>
+                    <a:p>
+                      <a:pPr>
+                        <a:lnSpc>
+                          <a:spcPct val="107000"/>
+                        </a:lnSpc>
+                        <a:spcAft>
+                          <a:spcPts val="800"/>
+                        </a:spcAft>
+                      </a:pPr>
+                      <a:r>
+                        <a:rPr lang="de-DE" sz="1200">
+                          <a:effectLst/>
+                        </a:rPr>
+                        <a:t>2</a:t>
+                      </a:r>
+                      <a:endParaRPr lang="de-DE" sz="1100">
+                        <a:effectLst/>
+                        <a:latin typeface="Calibri" panose="020F0502020204030204" pitchFamily="34" charset="0"/>
+                        <a:ea typeface="Calibri" panose="020F0502020204030204" pitchFamily="34" charset="0"/>
+                        <a:cs typeface="Times New Roman" panose="02020603050405020304" pitchFamily="18" charset="0"/>
+                      </a:endParaRPr>
+                    </a:p>
+                  </a:txBody>
+                  <a:tcPr marL="68580" marR="68580" marT="0" marB="0"/>
+                </a:tc>
+                <a:tc>
+                  <a:txBody>
+                    <a:bodyPr/>
+                    <a:lstStyle/>
+                    <a:p>
+                      <a:pPr>
+                        <a:lnSpc>
+                          <a:spcPct val="107000"/>
+                        </a:lnSpc>
+                        <a:spcAft>
+                          <a:spcPts val="800"/>
+                        </a:spcAft>
+                      </a:pPr>
+                      <a:r>
+                        <a:rPr lang="de-DE" sz="1200">
+                          <a:effectLst/>
+                        </a:rPr>
+                        <a:t>1</a:t>
+                      </a:r>
+                      <a:endParaRPr lang="de-DE" sz="1100">
+                        <a:effectLst/>
+                        <a:latin typeface="Calibri" panose="020F0502020204030204" pitchFamily="34" charset="0"/>
+                        <a:ea typeface="Calibri" panose="020F0502020204030204" pitchFamily="34" charset="0"/>
+                        <a:cs typeface="Times New Roman" panose="02020603050405020304" pitchFamily="18" charset="0"/>
+                      </a:endParaRPr>
+                    </a:p>
+                  </a:txBody>
+                  <a:tcPr marL="68580" marR="68580" marT="0" marB="0"/>
+                </a:tc>
+                <a:tc>
+                  <a:txBody>
+                    <a:bodyPr/>
+                    <a:lstStyle/>
+                    <a:p>
+                      <a:pPr>
+                        <a:lnSpc>
+                          <a:spcPct val="107000"/>
+                        </a:lnSpc>
+                        <a:spcAft>
+                          <a:spcPts val="800"/>
+                        </a:spcAft>
+                      </a:pPr>
+                      <a:r>
+                        <a:rPr lang="de-DE" sz="1200" dirty="0">
+                          <a:effectLst/>
+                        </a:rPr>
+                        <a:t>1</a:t>
+                      </a:r>
+                      <a:endParaRPr lang="de-DE" sz="1100" dirty="0">
+                        <a:effectLst/>
+                        <a:latin typeface="Calibri" panose="020F0502020204030204" pitchFamily="34" charset="0"/>
+                        <a:ea typeface="Calibri" panose="020F0502020204030204" pitchFamily="34" charset="0"/>
+                        <a:cs typeface="Times New Roman" panose="02020603050405020304" pitchFamily="18" charset="0"/>
+                      </a:endParaRPr>
+                    </a:p>
+                  </a:txBody>
+                  <a:tcPr marL="68580" marR="68580" marT="0" marB="0"/>
+                </a:tc>
+                <a:extLst>
+                  <a:ext uri="{0D108BD9-81ED-4DB2-BD59-A6C34878D82A}">
+                    <a16:rowId xmlns:a16="http://schemas.microsoft.com/office/drawing/2014/main" val="1345848"/>
+                  </a:ext>
+                </a:extLst>
+              </a:tr>
+            </a:tbl>
+          </a:graphicData>
+        </a:graphic>
+      </p:graphicFrame>
+    </p:spTree>
+    <p:extLst>
+      <p:ext uri="{BB962C8B-B14F-4D97-AF65-F5344CB8AC3E}">
+        <p14:creationId xmlns:p14="http://schemas.microsoft.com/office/powerpoint/2010/main" val="761563811"/>
+      </p:ext>
+    </p:extLst>
+  </p:cSld>
+  <p:clrMapOvr>
+    <a:masterClrMapping/>
+  </p:clrMapOvr>
+</p:sld>
+</file>
+
+<file path=ppt/slides/slide11.xml><?xml version="1.0" encoding="utf-8"?>
+<p:sld xmlns:a="http://schemas.openxmlformats.org/drawingml/2006/main" xmlns:r="http://schemas.openxmlformats.org/officeDocument/2006/relationships" xmlns:p="http://schemas.openxmlformats.org/presentationml/2006/main">
+  <p:cSld>
+    <p:spTree>
+      <p:nvGrpSpPr>
+        <p:cNvPr id="1" name=""/>
+        <p:cNvGrpSpPr/>
+        <p:nvPr/>
+      </p:nvGrpSpPr>
+      <p:grpSpPr>
+        <a:xfrm>
+          <a:off x="0" y="0"/>
+          <a:ext cx="0" cy="0"/>
+          <a:chOff x="0" y="0"/>
+          <a:chExt cx="0" cy="0"/>
+        </a:xfrm>
+      </p:grpSpPr>
+      <p:sp>
+        <p:nvSpPr>
+          <p:cNvPr id="2" name="Titel 1">
+            <a:extLst>
+              <a:ext uri="{FF2B5EF4-FFF2-40B4-BE49-F238E27FC236}">
+                <a16:creationId xmlns:a16="http://schemas.microsoft.com/office/drawing/2014/main" id="{7B07B2D2-ED84-8B86-D54D-F1F1530D7684}"/>
+              </a:ext>
+            </a:extLst>
+          </p:cNvPr>
+          <p:cNvSpPr>
+            <a:spLocks noGrp="1"/>
+          </p:cNvSpPr>
+          <p:nvPr>
+            <p:ph type="title"/>
+          </p:nvPr>
+        </p:nvSpPr>
+        <p:spPr/>
+        <p:txBody>
+          <a:bodyPr/>
+          <a:lstStyle/>
+          <a:p>
+            <a:r>
+              <a:rPr lang="de-DE" dirty="0"/>
+              <a:t>Modellierung</a:t>
+            </a:r>
+          </a:p>
+        </p:txBody>
+      </p:sp>
+      <p:sp>
+        <p:nvSpPr>
+          <p:cNvPr id="3" name="Textfeld 2">
+            <a:extLst>
+              <a:ext uri="{FF2B5EF4-FFF2-40B4-BE49-F238E27FC236}">
+                <a16:creationId xmlns:a16="http://schemas.microsoft.com/office/drawing/2014/main" id="{3AD9EA44-ADC8-566F-6383-716A8B4686BF}"/>
+              </a:ext>
+            </a:extLst>
+          </p:cNvPr>
+          <p:cNvSpPr txBox="1"/>
+          <p:nvPr/>
+        </p:nvSpPr>
+        <p:spPr>
+          <a:xfrm>
+            <a:off x="677334" y="1651518"/>
+            <a:ext cx="9894250" cy="1754326"/>
+          </a:xfrm>
+          <a:prstGeom prst="rect">
+            <a:avLst/>
+          </a:prstGeom>
+          <a:noFill/>
+        </p:spPr>
+        <p:txBody>
+          <a:bodyPr wrap="square" rtlCol="0">
+            <a:spAutoFit/>
+          </a:bodyPr>
+          <a:lstStyle/>
+          <a:p>
+            <a:r>
+              <a:rPr lang="de-DE" dirty="0"/>
+              <a:t>-Autoregressive-Distributed lag Modell für Drainage + Kurzerklärung für Präsentation (Max)</a:t>
+            </a:r>
+          </a:p>
+          <a:p>
+            <a:r>
+              <a:rPr lang="de-DE" dirty="0"/>
+              <a:t>-GAM(M) für Niedrigwasserevent + Autokorrelationsstruktur + wie fitten über verschiedene Member (</a:t>
+            </a:r>
+            <a:r>
+              <a:rPr lang="de-DE" dirty="0" err="1"/>
+              <a:t>fit_ardlm_across</a:t>
+            </a:r>
+            <a:r>
+              <a:rPr lang="de-DE" dirty="0"/>
+              <a:t>, q lag für y, p lag für </a:t>
+            </a:r>
+            <a:r>
+              <a:rPr lang="de-DE" dirty="0" err="1"/>
+              <a:t>kovariablen</a:t>
+            </a:r>
+            <a:r>
+              <a:rPr lang="de-DE" dirty="0"/>
+              <a:t>)+ multiples testen (Lisa)</a:t>
+            </a:r>
+          </a:p>
+          <a:p>
+            <a:r>
+              <a:rPr lang="de-DE" dirty="0"/>
+              <a:t>-ARIMA Modell wegen Autokorrelation?</a:t>
+            </a:r>
+          </a:p>
+          <a:p>
+            <a:endParaRPr lang="de-DE" dirty="0"/>
+          </a:p>
+          <a:p>
+            <a:r>
+              <a:rPr lang="de-DE" dirty="0"/>
+              <a:t>-Zeitkonstante Variablen als </a:t>
+            </a:r>
+            <a:r>
+              <a:rPr lang="de-DE" dirty="0" err="1"/>
+              <a:t>random</a:t>
+            </a:r>
+            <a:r>
+              <a:rPr lang="de-DE" dirty="0"/>
+              <a:t> </a:t>
+            </a:r>
+            <a:r>
+              <a:rPr lang="de-DE" dirty="0" err="1"/>
+              <a:t>intercept</a:t>
+            </a:r>
+            <a:r>
+              <a:rPr lang="de-DE" dirty="0"/>
+              <a:t> oder so </a:t>
+            </a:r>
+            <a:r>
+              <a:rPr lang="de-DE" dirty="0" err="1"/>
+              <a:t>einmodellieren</a:t>
+            </a:r>
+            <a:r>
+              <a:rPr lang="de-DE" dirty="0"/>
+              <a:t>?</a:t>
+            </a:r>
+          </a:p>
+        </p:txBody>
+      </p:sp>
+    </p:spTree>
+    <p:extLst>
+      <p:ext uri="{BB962C8B-B14F-4D97-AF65-F5344CB8AC3E}">
+        <p14:creationId xmlns:p14="http://schemas.microsoft.com/office/powerpoint/2010/main" val="3954240344"/>
+      </p:ext>
+    </p:extLst>
+  </p:cSld>
+  <p:clrMapOvr>
+    <a:masterClrMapping/>
+  </p:clrMapOvr>
+</p:sld>
+</file>
+
+<file path=ppt/slides/slide12.xml><?xml version="1.0" encoding="utf-8"?>
+<p:sld xmlns:a="http://schemas.openxmlformats.org/drawingml/2006/main" xmlns:r="http://schemas.openxmlformats.org/officeDocument/2006/relationships" xmlns:p="http://schemas.openxmlformats.org/presentationml/2006/main">
+  <p:cSld>
+    <p:spTree>
+      <p:nvGrpSpPr>
+        <p:cNvPr id="1" name=""/>
+        <p:cNvGrpSpPr/>
+        <p:nvPr/>
+      </p:nvGrpSpPr>
+      <p:grpSpPr>
+        <a:xfrm>
+          <a:off x="0" y="0"/>
+          <a:ext cx="0" cy="0"/>
+          <a:chOff x="0" y="0"/>
+          <a:chExt cx="0" cy="0"/>
+        </a:xfrm>
+      </p:grpSpPr>
+      <p:sp>
+        <p:nvSpPr>
+          <p:cNvPr id="2" name="Titel 1">
+            <a:extLst>
+              <a:ext uri="{FF2B5EF4-FFF2-40B4-BE49-F238E27FC236}">
+                <a16:creationId xmlns:a16="http://schemas.microsoft.com/office/drawing/2014/main" id="{786D7ED4-58E2-19B7-5018-298BA812B36D}"/>
+              </a:ext>
+            </a:extLst>
+          </p:cNvPr>
+          <p:cNvSpPr>
+            <a:spLocks noGrp="1"/>
+          </p:cNvSpPr>
+          <p:nvPr>
+            <p:ph type="title"/>
+          </p:nvPr>
+        </p:nvSpPr>
+        <p:spPr/>
+        <p:txBody>
+          <a:bodyPr/>
+          <a:lstStyle/>
+          <a:p>
+            <a:endParaRPr lang="de-DE" dirty="0"/>
+          </a:p>
+        </p:txBody>
+      </p:sp>
+    </p:spTree>
+    <p:extLst>
+      <p:ext uri="{BB962C8B-B14F-4D97-AF65-F5344CB8AC3E}">
+        <p14:creationId xmlns:p14="http://schemas.microsoft.com/office/powerpoint/2010/main" val="4264828743"/>
+      </p:ext>
+    </p:extLst>
+  </p:cSld>
+  <p:clrMapOvr>
+    <a:masterClrMapping/>
+  </p:clrMapOvr>
+</p:sld>
+</file>
+
+<file path=ppt/slides/slide13.xml><?xml version="1.0" encoding="utf-8"?>
+<p:sld xmlns:a="http://schemas.openxmlformats.org/drawingml/2006/main" xmlns:r="http://schemas.openxmlformats.org/officeDocument/2006/relationships" xmlns:p="http://schemas.openxmlformats.org/presentationml/2006/main">
+  <p:cSld>
+    <p:spTree>
+      <p:nvGrpSpPr>
+        <p:cNvPr id="1" name=""/>
+        <p:cNvGrpSpPr/>
+        <p:nvPr/>
+      </p:nvGrpSpPr>
+      <p:grpSpPr>
+        <a:xfrm>
+          <a:off x="0" y="0"/>
+          <a:ext cx="0" cy="0"/>
+          <a:chOff x="0" y="0"/>
+          <a:chExt cx="0" cy="0"/>
+        </a:xfrm>
+      </p:grpSpPr>
+      <p:sp>
+        <p:nvSpPr>
           <p:cNvPr id="2" name="Titel 1">
             <a:extLst>
               <a:ext uri="{FF2B5EF4-FFF2-40B4-BE49-F238E27FC236}">
@@ -6054,7 +9415,7 @@
 </p:sld>
 </file>
 
-<file path=ppt/slides/slide11.xml><?xml version="1.0" encoding="utf-8"?>
+<file path=ppt/slides/slide14.xml><?xml version="1.0" encoding="utf-8"?>
 <p:sld xmlns:a="http://schemas.openxmlformats.org/drawingml/2006/main" xmlns:r="http://schemas.openxmlformats.org/officeDocument/2006/relationships" xmlns:p="http://schemas.openxmlformats.org/presentationml/2006/main">
   <p:cSld>
     <p:spTree>
@@ -6410,7 +9771,7 @@
           <p:cNvPr id="2" name="Titel 1">
             <a:extLst>
               <a:ext uri="{FF2B5EF4-FFF2-40B4-BE49-F238E27FC236}">
-                <a16:creationId xmlns:a16="http://schemas.microsoft.com/office/drawing/2014/main" id="{0582A5F1-2275-1B0D-FC6F-46FADEFF92ED}"/>
+                <a16:creationId xmlns:a16="http://schemas.microsoft.com/office/drawing/2014/main" id="{3DD09BF8-FAC3-E63B-3496-E152219E4B18}"/>
               </a:ext>
             </a:extLst>
           </p:cNvPr>
@@ -6435,63 +9796,33 @@
       </p:sp>
       <p:sp>
         <p:nvSpPr>
-          <p:cNvPr id="3" name="Textfeld 2">
+          <p:cNvPr id="3" name="Textplatzhalter 2">
             <a:extLst>
               <a:ext uri="{FF2B5EF4-FFF2-40B4-BE49-F238E27FC236}">
-                <a16:creationId xmlns:a16="http://schemas.microsoft.com/office/drawing/2014/main" id="{A2E2FC45-7583-EB16-B953-5CC42ED04F93}"/>
+                <a16:creationId xmlns:a16="http://schemas.microsoft.com/office/drawing/2014/main" id="{F484CF18-D398-CCA6-A7F1-2F2FF6DF4A67}"/>
               </a:ext>
             </a:extLst>
           </p:cNvPr>
-          <p:cNvSpPr txBox="1"/>
-          <p:nvPr/>
-        </p:nvSpPr>
-        <p:spPr>
-          <a:xfrm>
-            <a:off x="755780" y="1688841"/>
-            <a:ext cx="8873412" cy="1477328"/>
-          </a:xfrm>
-          <a:prstGeom prst="rect">
-            <a:avLst/>
-          </a:prstGeom>
-          <a:noFill/>
-        </p:spPr>
-        <p:txBody>
-          <a:bodyPr wrap="square" rtlCol="0">
-            <a:spAutoFit/>
-          </a:bodyPr>
+          <p:cNvSpPr>
+            <a:spLocks noGrp="1"/>
+          </p:cNvSpPr>
+          <p:nvPr>
+            <p:ph type="body" idx="1"/>
+          </p:nvPr>
+        </p:nvSpPr>
+        <p:spPr/>
+        <p:txBody>
+          <a:bodyPr/>
           <a:lstStyle/>
           <a:p>
-            <a:r>
-              <a:rPr lang="de-DE" dirty="0"/>
-              <a:t>Hier: Grafik mit Verlauf Anzahl der Niedrigwasserevents pro Jahr für alle 3 Pegel (ändern auf hydrologisches Winterhalbjahr) (Chris),</a:t>
-            </a:r>
-          </a:p>
-          <a:p>
-            <a:r>
-              <a:rPr lang="de-DE" dirty="0"/>
-              <a:t>Pro Pegel: </a:t>
-            </a:r>
-            <a:r>
-              <a:rPr lang="de-DE" dirty="0" err="1"/>
-              <a:t>Unadjustierter</a:t>
-            </a:r>
-            <a:r>
-              <a:rPr lang="de-DE" dirty="0"/>
-              <a:t> Zusammenhang einzelner Treiber mit Drainage/Anzahl der Niedrigwasserevents (evtl. Grafik und Korrelationen) (Jonas),</a:t>
-            </a:r>
-          </a:p>
-          <a:p>
-            <a:r>
-              <a:rPr lang="de-DE" dirty="0"/>
-              <a:t>Autokorrelation von Drainage und Treibern (Lisa)</a:t>
-            </a:r>
+            <a:endParaRPr lang="de-DE"/>
           </a:p>
         </p:txBody>
       </p:sp>
     </p:spTree>
     <p:extLst>
       <p:ext uri="{BB962C8B-B14F-4D97-AF65-F5344CB8AC3E}">
-        <p14:creationId xmlns:p14="http://schemas.microsoft.com/office/powerpoint/2010/main" val="4293320679"/>
+        <p14:creationId xmlns:p14="http://schemas.microsoft.com/office/powerpoint/2010/main" val="1789160217"/>
       </p:ext>
     </p:extLst>
   </p:cSld>
@@ -6518,10 +9849,87 @@
           <a:chExt cx="0" cy="0"/>
         </a:xfrm>
       </p:grpSpPr>
+      <p:sp>
+        <p:nvSpPr>
+          <p:cNvPr id="2" name="Titel 1">
+            <a:extLst>
+              <a:ext uri="{FF2B5EF4-FFF2-40B4-BE49-F238E27FC236}">
+                <a16:creationId xmlns:a16="http://schemas.microsoft.com/office/drawing/2014/main" id="{0582A5F1-2275-1B0D-FC6F-46FADEFF92ED}"/>
+              </a:ext>
+            </a:extLst>
+          </p:cNvPr>
+          <p:cNvSpPr>
+            <a:spLocks noGrp="1"/>
+          </p:cNvSpPr>
+          <p:nvPr>
+            <p:ph type="title"/>
+          </p:nvPr>
+        </p:nvSpPr>
+        <p:spPr/>
+        <p:txBody>
+          <a:bodyPr/>
+          <a:lstStyle/>
+          <a:p>
+            <a:r>
+              <a:rPr lang="de-DE" dirty="0"/>
+              <a:t>Deskriptive Analyse</a:t>
+            </a:r>
+          </a:p>
+        </p:txBody>
+      </p:sp>
+      <p:sp>
+        <p:nvSpPr>
+          <p:cNvPr id="3" name="Textfeld 2">
+            <a:extLst>
+              <a:ext uri="{FF2B5EF4-FFF2-40B4-BE49-F238E27FC236}">
+                <a16:creationId xmlns:a16="http://schemas.microsoft.com/office/drawing/2014/main" id="{A2E2FC45-7583-EB16-B953-5CC42ED04F93}"/>
+              </a:ext>
+            </a:extLst>
+          </p:cNvPr>
+          <p:cNvSpPr txBox="1"/>
+          <p:nvPr/>
+        </p:nvSpPr>
+        <p:spPr>
+          <a:xfrm>
+            <a:off x="755780" y="1688841"/>
+            <a:ext cx="8873412" cy="1200329"/>
+          </a:xfrm>
+          <a:prstGeom prst="rect">
+            <a:avLst/>
+          </a:prstGeom>
+          <a:noFill/>
+        </p:spPr>
+        <p:txBody>
+          <a:bodyPr wrap="square" rtlCol="0">
+            <a:spAutoFit/>
+          </a:bodyPr>
+          <a:lstStyle/>
+          <a:p>
+            <a:r>
+              <a:rPr lang="de-DE" dirty="0"/>
+              <a:t>Hier: Grafik mit Verlauf Anzahl der Niedrigwasserevents pro Jahr für alle 3 Pegel (ändern auf hydrologisches Winterhalbjahr) (Chris),</a:t>
+            </a:r>
+          </a:p>
+          <a:p>
+            <a:r>
+              <a:rPr lang="de-DE" dirty="0"/>
+              <a:t>Pro Pegel: </a:t>
+            </a:r>
+            <a:r>
+              <a:rPr lang="de-DE" dirty="0" err="1"/>
+              <a:t>Unadjustierter</a:t>
+            </a:r>
+            <a:r>
+              <a:rPr lang="de-DE" dirty="0"/>
+              <a:t> Zusammenhang einzelner Treiber mit Drainage/Anzahl der Niedrigwasserevents (evtl. Grafik und Korrelationen) (Jonas)</a:t>
+            </a:r>
+          </a:p>
+        </p:txBody>
+      </p:sp>
     </p:spTree>
     <p:extLst>
       <p:ext uri="{BB962C8B-B14F-4D97-AF65-F5344CB8AC3E}">
-        <p14:creationId xmlns:p14="http://schemas.microsoft.com/office/powerpoint/2010/main" val="3277973321"/>
+        <p14:creationId xmlns:p14="http://schemas.microsoft.com/office/powerpoint/2010/main" val="4293320679"/>
       </p:ext>
     </p:extLst>
   </p:cSld>
@@ -6553,7 +9961,7 @@
           <p:cNvPr id="2" name="Titel 1">
             <a:extLst>
               <a:ext uri="{FF2B5EF4-FFF2-40B4-BE49-F238E27FC236}">
-                <a16:creationId xmlns:a16="http://schemas.microsoft.com/office/drawing/2014/main" id="{7B07B2D2-ED84-8B86-D54D-F1F1530D7684}"/>
+                <a16:creationId xmlns:a16="http://schemas.microsoft.com/office/drawing/2014/main" id="{F955980E-962C-DC3F-0089-D3EC4C386981}"/>
               </a:ext>
             </a:extLst>
           </p:cNvPr>
@@ -6570,112 +9978,229 @@
           <a:lstStyle/>
           <a:p>
             <a:r>
-              <a:rPr lang="de-DE" dirty="0"/>
-              <a:t>Modellierung</a:t>
-            </a:r>
-          </a:p>
-        </p:txBody>
-      </p:sp>
-      <p:sp>
-        <p:nvSpPr>
-          <p:cNvPr id="3" name="Textfeld 2">
+              <a:rPr lang="de-DE"/>
+              <a:t>Autokorrelation in den Daten</a:t>
+            </a:r>
+            <a:endParaRPr lang="de-DE" dirty="0"/>
+          </a:p>
+        </p:txBody>
+      </p:sp>
+      <p:sp>
+        <p:nvSpPr>
+          <p:cNvPr id="3" name="Inhaltsplatzhalter 2">
             <a:extLst>
               <a:ext uri="{FF2B5EF4-FFF2-40B4-BE49-F238E27FC236}">
-                <a16:creationId xmlns:a16="http://schemas.microsoft.com/office/drawing/2014/main" id="{3AD9EA44-ADC8-566F-6383-716A8B4686BF}"/>
+                <a16:creationId xmlns:a16="http://schemas.microsoft.com/office/drawing/2014/main" id="{3E0451F8-FFC6-610B-6F16-31E6A6B74741}"/>
               </a:ext>
             </a:extLst>
           </p:cNvPr>
-          <p:cNvSpPr txBox="1"/>
-          <p:nvPr/>
+          <p:cNvSpPr>
+            <a:spLocks noGrp="1"/>
+          </p:cNvSpPr>
+          <p:nvPr>
+            <p:ph idx="1"/>
+          </p:nvPr>
         </p:nvSpPr>
         <p:spPr>
           <a:xfrm>
-            <a:off x="677334" y="1651518"/>
-            <a:ext cx="9894250" cy="1754326"/>
+            <a:off x="677334" y="1362075"/>
+            <a:ext cx="8596668" cy="5262245"/>
+          </a:xfrm>
+        </p:spPr>
+        <p:txBody>
+          <a:bodyPr>
+            <a:normAutofit/>
+          </a:bodyPr>
+          <a:lstStyle/>
+          <a:p>
+            <a:r>
+              <a:rPr lang="de-DE" dirty="0"/>
+              <a:t>Zielvariablen:</a:t>
+            </a:r>
+          </a:p>
+          <a:p>
+            <a:pPr marL="0" indent="0">
+              <a:buNone/>
+            </a:pPr>
+            <a:r>
+              <a:rPr lang="de-DE" dirty="0"/>
+              <a:t>	</a:t>
+            </a:r>
+            <a:r>
+              <a:rPr lang="de-DE" dirty="0" err="1"/>
+              <a:t>Bsp</a:t>
+            </a:r>
+            <a:r>
+              <a:rPr lang="de-DE" dirty="0"/>
+              <a:t>: Niedrigwasserevent (Pegel: Isar/Mittenwald, Jahreszeit: Winter)</a:t>
+            </a:r>
+          </a:p>
+          <a:p>
+            <a:endParaRPr lang="de-DE" dirty="0"/>
+          </a:p>
+          <a:p>
+            <a:endParaRPr lang="de-DE" dirty="0"/>
+          </a:p>
+          <a:p>
+            <a:endParaRPr lang="de-DE" dirty="0"/>
+          </a:p>
+          <a:p>
+            <a:endParaRPr lang="de-DE" dirty="0"/>
+          </a:p>
+          <a:p>
+            <a:endParaRPr lang="de-DE" dirty="0"/>
+          </a:p>
+          <a:p>
+            <a:endParaRPr lang="de-DE" dirty="0"/>
+          </a:p>
+          <a:p>
+            <a:endParaRPr lang="de-DE" dirty="0"/>
+          </a:p>
+          <a:p>
+            <a:endParaRPr lang="de-DE" dirty="0"/>
+          </a:p>
+          <a:p>
+            <a:pPr marL="0" indent="0">
+              <a:buNone/>
+            </a:pPr>
+            <a:r>
+              <a:rPr lang="de-DE" dirty="0"/>
+              <a:t>Analog für alle drei Pegel und beide Jahreszeiten, sowie für die Variable Abfluss</a:t>
+            </a:r>
+          </a:p>
+          <a:p>
+            <a:pPr marL="0" indent="0">
+              <a:buNone/>
+            </a:pPr>
+            <a:r>
+              <a:rPr lang="de-DE" dirty="0"/>
+              <a:t>		Zielvariablen Abfluss und Niedrigwasserevent positiv autokorreliert</a:t>
+            </a:r>
+          </a:p>
+        </p:txBody>
+      </p:sp>
+      <p:pic>
+        <p:nvPicPr>
+          <p:cNvPr id="9" name="Grafik 8">
+            <a:extLst>
+              <a:ext uri="{FF2B5EF4-FFF2-40B4-BE49-F238E27FC236}">
+                <a16:creationId xmlns:a16="http://schemas.microsoft.com/office/drawing/2014/main" id="{35A35EA0-255B-A01A-1B34-CB9B0F5B0B24}"/>
+              </a:ext>
+            </a:extLst>
+          </p:cNvPr>
+          <p:cNvPicPr>
+            <a:picLocks noChangeAspect="1"/>
+          </p:cNvPicPr>
+          <p:nvPr/>
+        </p:nvPicPr>
+        <p:blipFill>
+          <a:blip r:embed="rId2">
+            <a:extLst>
+              <a:ext uri="{28A0092B-C50C-407E-A947-70E740481C1C}">
+                <a14:useLocalDpi xmlns:a14="http://schemas.microsoft.com/office/drawing/2010/main" val="0"/>
+              </a:ext>
+            </a:extLst>
+          </a:blip>
+          <a:stretch>
+            <a:fillRect/>
+          </a:stretch>
+        </p:blipFill>
+        <p:spPr>
+          <a:xfrm>
+            <a:off x="529548" y="2187966"/>
+            <a:ext cx="5169236" cy="3190157"/>
           </a:xfrm>
           <a:prstGeom prst="rect">
             <a:avLst/>
           </a:prstGeom>
-          <a:noFill/>
         </p:spPr>
-        <p:txBody>
-          <a:bodyPr wrap="square" rtlCol="0">
-            <a:spAutoFit/>
-          </a:bodyPr>
-          <a:lstStyle/>
-          <a:p>
-            <a:r>
-              <a:rPr lang="de-DE" dirty="0"/>
-              <a:t>-Autoregressive-Distributed lag Modell für Drainage + Kurzerklärung für Präsentation (Max)</a:t>
-            </a:r>
-          </a:p>
-          <a:p>
-            <a:r>
-              <a:rPr lang="de-DE" dirty="0"/>
-              <a:t>-GAM(M) für Niedrigwasserevent + Autokorrelationsstruktur + wie fitten über verschiedene Member (</a:t>
-            </a:r>
-            <a:r>
-              <a:rPr lang="de-DE" dirty="0" err="1"/>
-              <a:t>fit_ardlm_across</a:t>
-            </a:r>
-            <a:r>
-              <a:rPr lang="de-DE" dirty="0"/>
-              <a:t>, q lag für y, p lag für </a:t>
-            </a:r>
-            <a:r>
-              <a:rPr lang="de-DE" dirty="0" err="1"/>
-              <a:t>kovariablen</a:t>
-            </a:r>
-            <a:r>
-              <a:rPr lang="de-DE" dirty="0"/>
-              <a:t>)+ multiples testen (Lisa)</a:t>
-            </a:r>
-          </a:p>
-          <a:p>
-            <a:r>
-              <a:rPr lang="de-DE" dirty="0"/>
-              <a:t>-ARIMA Modell wegen Autokorrelation?</a:t>
-            </a:r>
-          </a:p>
-          <a:p>
-            <a:endParaRPr lang="de-DE" dirty="0"/>
-          </a:p>
-          <a:p>
-            <a:r>
-              <a:rPr lang="de-DE" dirty="0"/>
-              <a:t>-Zeitkonstante Variablen als </a:t>
-            </a:r>
-            <a:r>
-              <a:rPr lang="de-DE" dirty="0" err="1"/>
-              <a:t>random</a:t>
-            </a:r>
-            <a:r>
-              <a:rPr lang="de-DE" dirty="0"/>
-              <a:t> </a:t>
-            </a:r>
-            <a:r>
-              <a:rPr lang="de-DE" dirty="0" err="1"/>
-              <a:t>intercept</a:t>
-            </a:r>
-            <a:r>
-              <a:rPr lang="de-DE" dirty="0"/>
-              <a:t> oder so </a:t>
-            </a:r>
-            <a:r>
-              <a:rPr lang="de-DE" dirty="0" err="1"/>
-              <a:t>einmodellieren</a:t>
-            </a:r>
-            <a:r>
-              <a:rPr lang="de-DE" dirty="0"/>
-              <a:t>?</a:t>
-            </a:r>
-          </a:p>
-        </p:txBody>
-      </p:sp>
+      </p:pic>
+      <p:pic>
+        <p:nvPicPr>
+          <p:cNvPr id="11" name="Grafik 10">
+            <a:extLst>
+              <a:ext uri="{FF2B5EF4-FFF2-40B4-BE49-F238E27FC236}">
+                <a16:creationId xmlns:a16="http://schemas.microsoft.com/office/drawing/2014/main" id="{8E4333E7-08A0-8136-DFFF-FE730CAB201A}"/>
+              </a:ext>
+            </a:extLst>
+          </p:cNvPr>
+          <p:cNvPicPr>
+            <a:picLocks noChangeAspect="1"/>
+          </p:cNvPicPr>
+          <p:nvPr/>
+        </p:nvPicPr>
+        <p:blipFill>
+          <a:blip r:embed="rId3">
+            <a:extLst>
+              <a:ext uri="{28A0092B-C50C-407E-A947-70E740481C1C}">
+                <a14:useLocalDpi xmlns:a14="http://schemas.microsoft.com/office/drawing/2010/main" val="0"/>
+              </a:ext>
+            </a:extLst>
+          </a:blip>
+          <a:stretch>
+            <a:fillRect/>
+          </a:stretch>
+        </p:blipFill>
+        <p:spPr>
+          <a:xfrm>
+            <a:off x="5698784" y="2183011"/>
+            <a:ext cx="5169236" cy="3190157"/>
+          </a:xfrm>
+          <a:prstGeom prst="rect">
+            <a:avLst/>
+          </a:prstGeom>
+        </p:spPr>
+      </p:pic>
+      <p:cxnSp>
+        <p:nvCxnSpPr>
+          <p:cNvPr id="13" name="Gerade Verbindung mit Pfeil 12">
+            <a:extLst>
+              <a:ext uri="{FF2B5EF4-FFF2-40B4-BE49-F238E27FC236}">
+                <a16:creationId xmlns:a16="http://schemas.microsoft.com/office/drawing/2014/main" id="{6BED1ABA-F839-F482-56D6-41B2C164D1C5}"/>
+              </a:ext>
+            </a:extLst>
+          </p:cNvPr>
+          <p:cNvCxnSpPr>
+            <a:cxnSpLocks/>
+          </p:cNvCxnSpPr>
+          <p:nvPr/>
+        </p:nvCxnSpPr>
+        <p:spPr>
+          <a:xfrm>
+            <a:off x="762622" y="5950650"/>
+            <a:ext cx="852818" cy="0"/>
+          </a:xfrm>
+          <a:prstGeom prst="straightConnector1">
+            <a:avLst/>
+          </a:prstGeom>
+          <a:ln>
+            <a:solidFill>
+              <a:schemeClr val="accent1">
+                <a:lumMod val="75000"/>
+              </a:schemeClr>
+            </a:solidFill>
+            <a:tailEnd type="triangle"/>
+          </a:ln>
+        </p:spPr>
+        <p:style>
+          <a:lnRef idx="1">
+            <a:schemeClr val="accent1"/>
+          </a:lnRef>
+          <a:fillRef idx="0">
+            <a:schemeClr val="accent1"/>
+          </a:fillRef>
+          <a:effectRef idx="0">
+            <a:schemeClr val="accent1"/>
+          </a:effectRef>
+          <a:fontRef idx="minor">
+            <a:schemeClr val="tx1"/>
+          </a:fontRef>
+        </p:style>
+      </p:cxnSp>
     </p:spTree>
     <p:extLst>
       <p:ext uri="{BB962C8B-B14F-4D97-AF65-F5344CB8AC3E}">
-        <p14:creationId xmlns:p14="http://schemas.microsoft.com/office/powerpoint/2010/main" val="3954240344"/>
+        <p14:creationId xmlns:p14="http://schemas.microsoft.com/office/powerpoint/2010/main" val="2426547854"/>
       </p:ext>
     </p:extLst>
   </p:cSld>
@@ -6704,33 +10229,593 @@
       </p:grpSpPr>
       <p:sp>
         <p:nvSpPr>
-          <p:cNvPr id="2" name="Titel 1">
+          <p:cNvPr id="4" name="Inhaltsplatzhalter 2">
             <a:extLst>
               <a:ext uri="{FF2B5EF4-FFF2-40B4-BE49-F238E27FC236}">
-                <a16:creationId xmlns:a16="http://schemas.microsoft.com/office/drawing/2014/main" id="{786D7ED4-58E2-19B7-5018-298BA812B36D}"/>
+                <a16:creationId xmlns:a16="http://schemas.microsoft.com/office/drawing/2014/main" id="{AFBD718B-AB59-7003-5500-59F35BF41C6E}"/>
               </a:ext>
             </a:extLst>
           </p:cNvPr>
-          <p:cNvSpPr>
-            <a:spLocks noGrp="1"/>
+          <p:cNvSpPr txBox="1">
+            <a:spLocks/>
           </p:cNvSpPr>
-          <p:nvPr>
-            <p:ph type="title"/>
-          </p:nvPr>
-        </p:nvSpPr>
-        <p:spPr/>
+          <p:nvPr/>
+        </p:nvSpPr>
+        <p:spPr>
+          <a:xfrm>
+            <a:off x="556036" y="596965"/>
+            <a:ext cx="9715724" cy="5925755"/>
+          </a:xfrm>
+          <a:prstGeom prst="rect">
+            <a:avLst/>
+          </a:prstGeom>
+        </p:spPr>
         <p:txBody>
           <a:bodyPr/>
-          <a:lstStyle/>
-          <a:p>
+          <a:lstStyle>
+            <a:lvl1pPr marL="342900" indent="-342900" algn="l" defTabSz="457200" rtl="0" eaLnBrk="1" latinLnBrk="0" hangingPunct="1">
+              <a:spcBef>
+                <a:spcPts val="1000"/>
+              </a:spcBef>
+              <a:spcAft>
+                <a:spcPts val="0"/>
+              </a:spcAft>
+              <a:buClr>
+                <a:schemeClr val="accent1"/>
+              </a:buClr>
+              <a:buSzPct val="80000"/>
+              <a:buFont typeface="Wingdings 3" charset="2"/>
+              <a:buChar char=""/>
+              <a:defRPr sz="1800" kern="1200">
+                <a:solidFill>
+                  <a:schemeClr val="tx1">
+                    <a:lumMod val="75000"/>
+                    <a:lumOff val="25000"/>
+                  </a:schemeClr>
+                </a:solidFill>
+                <a:latin typeface="+mn-lt"/>
+                <a:ea typeface="+mn-ea"/>
+                <a:cs typeface="+mn-cs"/>
+              </a:defRPr>
+            </a:lvl1pPr>
+            <a:lvl2pPr marL="742950" indent="-285750" algn="l" defTabSz="457200" rtl="0" eaLnBrk="1" latinLnBrk="0" hangingPunct="1">
+              <a:spcBef>
+                <a:spcPts val="1000"/>
+              </a:spcBef>
+              <a:spcAft>
+                <a:spcPts val="0"/>
+              </a:spcAft>
+              <a:buClr>
+                <a:schemeClr val="accent1"/>
+              </a:buClr>
+              <a:buSzPct val="80000"/>
+              <a:buFont typeface="Wingdings 3" charset="2"/>
+              <a:buChar char=""/>
+              <a:defRPr sz="1600" kern="1200">
+                <a:solidFill>
+                  <a:schemeClr val="tx1">
+                    <a:lumMod val="75000"/>
+                    <a:lumOff val="25000"/>
+                  </a:schemeClr>
+                </a:solidFill>
+                <a:latin typeface="+mn-lt"/>
+                <a:ea typeface="+mn-ea"/>
+                <a:cs typeface="+mn-cs"/>
+              </a:defRPr>
+            </a:lvl2pPr>
+            <a:lvl3pPr marL="1143000" indent="-228600" algn="l" defTabSz="457200" rtl="0" eaLnBrk="1" latinLnBrk="0" hangingPunct="1">
+              <a:spcBef>
+                <a:spcPts val="1000"/>
+              </a:spcBef>
+              <a:spcAft>
+                <a:spcPts val="0"/>
+              </a:spcAft>
+              <a:buClr>
+                <a:schemeClr val="accent1"/>
+              </a:buClr>
+              <a:buSzPct val="80000"/>
+              <a:buFont typeface="Wingdings 3" charset="2"/>
+              <a:buChar char=""/>
+              <a:defRPr sz="1400" kern="1200">
+                <a:solidFill>
+                  <a:schemeClr val="tx1">
+                    <a:lumMod val="75000"/>
+                    <a:lumOff val="25000"/>
+                  </a:schemeClr>
+                </a:solidFill>
+                <a:latin typeface="+mn-lt"/>
+                <a:ea typeface="+mn-ea"/>
+                <a:cs typeface="+mn-cs"/>
+              </a:defRPr>
+            </a:lvl3pPr>
+            <a:lvl4pPr marL="1600200" indent="-228600" algn="l" defTabSz="457200" rtl="0" eaLnBrk="1" latinLnBrk="0" hangingPunct="1">
+              <a:spcBef>
+                <a:spcPts val="1000"/>
+              </a:spcBef>
+              <a:spcAft>
+                <a:spcPts val="0"/>
+              </a:spcAft>
+              <a:buClr>
+                <a:schemeClr val="accent1"/>
+              </a:buClr>
+              <a:buSzPct val="80000"/>
+              <a:buFont typeface="Wingdings 3" charset="2"/>
+              <a:buChar char=""/>
+              <a:defRPr sz="1200" kern="1200">
+                <a:solidFill>
+                  <a:schemeClr val="tx1">
+                    <a:lumMod val="75000"/>
+                    <a:lumOff val="25000"/>
+                  </a:schemeClr>
+                </a:solidFill>
+                <a:latin typeface="+mn-lt"/>
+                <a:ea typeface="+mn-ea"/>
+                <a:cs typeface="+mn-cs"/>
+              </a:defRPr>
+            </a:lvl4pPr>
+            <a:lvl5pPr marL="2057400" indent="-228600" algn="l" defTabSz="457200" rtl="0" eaLnBrk="1" latinLnBrk="0" hangingPunct="1">
+              <a:spcBef>
+                <a:spcPts val="1000"/>
+              </a:spcBef>
+              <a:spcAft>
+                <a:spcPts val="0"/>
+              </a:spcAft>
+              <a:buClr>
+                <a:schemeClr val="accent1"/>
+              </a:buClr>
+              <a:buSzPct val="80000"/>
+              <a:buFont typeface="Wingdings 3" charset="2"/>
+              <a:buChar char=""/>
+              <a:defRPr sz="1200" kern="1200">
+                <a:solidFill>
+                  <a:schemeClr val="tx1">
+                    <a:lumMod val="75000"/>
+                    <a:lumOff val="25000"/>
+                  </a:schemeClr>
+                </a:solidFill>
+                <a:latin typeface="+mn-lt"/>
+                <a:ea typeface="+mn-ea"/>
+                <a:cs typeface="+mn-cs"/>
+              </a:defRPr>
+            </a:lvl5pPr>
+            <a:lvl6pPr marL="2514600" indent="-228600" algn="l" defTabSz="457200" rtl="0" eaLnBrk="1" latinLnBrk="0" hangingPunct="1">
+              <a:spcBef>
+                <a:spcPts val="1000"/>
+              </a:spcBef>
+              <a:spcAft>
+                <a:spcPts val="0"/>
+              </a:spcAft>
+              <a:buClr>
+                <a:schemeClr val="accent1"/>
+              </a:buClr>
+              <a:buSzPct val="80000"/>
+              <a:buFont typeface="Wingdings 3" charset="2"/>
+              <a:buChar char=""/>
+              <a:defRPr sz="1200" kern="1200">
+                <a:solidFill>
+                  <a:schemeClr val="tx1">
+                    <a:lumMod val="75000"/>
+                    <a:lumOff val="25000"/>
+                  </a:schemeClr>
+                </a:solidFill>
+                <a:latin typeface="+mn-lt"/>
+                <a:ea typeface="+mn-ea"/>
+                <a:cs typeface="+mn-cs"/>
+              </a:defRPr>
+            </a:lvl6pPr>
+            <a:lvl7pPr marL="2971800" indent="-228600" algn="l" defTabSz="457200" rtl="0" eaLnBrk="1" latinLnBrk="0" hangingPunct="1">
+              <a:spcBef>
+                <a:spcPts val="1000"/>
+              </a:spcBef>
+              <a:spcAft>
+                <a:spcPts val="0"/>
+              </a:spcAft>
+              <a:buClr>
+                <a:schemeClr val="accent1"/>
+              </a:buClr>
+              <a:buSzPct val="80000"/>
+              <a:buFont typeface="Wingdings 3" charset="2"/>
+              <a:buChar char=""/>
+              <a:defRPr sz="1200" kern="1200">
+                <a:solidFill>
+                  <a:schemeClr val="tx1">
+                    <a:lumMod val="75000"/>
+                    <a:lumOff val="25000"/>
+                  </a:schemeClr>
+                </a:solidFill>
+                <a:latin typeface="+mn-lt"/>
+                <a:ea typeface="+mn-ea"/>
+                <a:cs typeface="+mn-cs"/>
+              </a:defRPr>
+            </a:lvl7pPr>
+            <a:lvl8pPr marL="3429000" indent="-228600" algn="l" defTabSz="457200" rtl="0" eaLnBrk="1" latinLnBrk="0" hangingPunct="1">
+              <a:spcBef>
+                <a:spcPts val="1000"/>
+              </a:spcBef>
+              <a:spcAft>
+                <a:spcPts val="0"/>
+              </a:spcAft>
+              <a:buClr>
+                <a:schemeClr val="accent1"/>
+              </a:buClr>
+              <a:buSzPct val="80000"/>
+              <a:buFont typeface="Wingdings 3" charset="2"/>
+              <a:buChar char=""/>
+              <a:defRPr sz="1200" kern="1200">
+                <a:solidFill>
+                  <a:schemeClr val="tx1">
+                    <a:lumMod val="75000"/>
+                    <a:lumOff val="25000"/>
+                  </a:schemeClr>
+                </a:solidFill>
+                <a:latin typeface="+mn-lt"/>
+                <a:ea typeface="+mn-ea"/>
+                <a:cs typeface="+mn-cs"/>
+              </a:defRPr>
+            </a:lvl8pPr>
+            <a:lvl9pPr marL="3886200" indent="-228600" algn="l" defTabSz="457200" rtl="0" eaLnBrk="1" latinLnBrk="0" hangingPunct="1">
+              <a:spcBef>
+                <a:spcPts val="1000"/>
+              </a:spcBef>
+              <a:spcAft>
+                <a:spcPts val="0"/>
+              </a:spcAft>
+              <a:buClr>
+                <a:schemeClr val="accent1"/>
+              </a:buClr>
+              <a:buSzPct val="80000"/>
+              <a:buFont typeface="Wingdings 3" charset="2"/>
+              <a:buChar char=""/>
+              <a:defRPr sz="1200" kern="1200">
+                <a:solidFill>
+                  <a:schemeClr val="tx1">
+                    <a:lumMod val="75000"/>
+                    <a:lumOff val="25000"/>
+                  </a:schemeClr>
+                </a:solidFill>
+                <a:latin typeface="+mn-lt"/>
+                <a:ea typeface="+mn-ea"/>
+                <a:cs typeface="+mn-cs"/>
+              </a:defRPr>
+            </a:lvl9pPr>
+          </a:lstStyle>
+          <a:p>
+            <a:r>
+              <a:rPr lang="de-DE" dirty="0"/>
+              <a:t>Mögliche Treiber:</a:t>
+            </a:r>
+          </a:p>
+          <a:p>
+            <a:pPr marL="0" indent="0">
+              <a:buNone/>
+            </a:pPr>
+            <a:r>
+              <a:rPr lang="de-DE" dirty="0"/>
+              <a:t>	Bps: Temperatur (Pegel: Isar/Mittenwald, Jahreszeit: Winter)</a:t>
+            </a:r>
+          </a:p>
+          <a:p>
+            <a:pPr marL="0" indent="0">
+              <a:buNone/>
+            </a:pPr>
             <a:endParaRPr lang="de-DE" dirty="0"/>
           </a:p>
-        </p:txBody>
-      </p:sp>
+          <a:p>
+            <a:pPr marL="0" indent="0">
+              <a:buNone/>
+            </a:pPr>
+            <a:endParaRPr lang="de-DE" dirty="0"/>
+          </a:p>
+          <a:p>
+            <a:pPr marL="0" indent="0">
+              <a:buNone/>
+            </a:pPr>
+            <a:endParaRPr lang="de-DE" dirty="0"/>
+          </a:p>
+          <a:p>
+            <a:pPr marL="0" indent="0">
+              <a:buNone/>
+            </a:pPr>
+            <a:endParaRPr lang="de-DE" dirty="0"/>
+          </a:p>
+          <a:p>
+            <a:pPr marL="0" indent="0">
+              <a:buNone/>
+            </a:pPr>
+            <a:endParaRPr lang="de-DE" dirty="0"/>
+          </a:p>
+          <a:p>
+            <a:pPr marL="0" indent="0">
+              <a:buNone/>
+            </a:pPr>
+            <a:endParaRPr lang="de-DE" dirty="0"/>
+          </a:p>
+          <a:p>
+            <a:pPr marL="0" indent="0">
+              <a:buNone/>
+            </a:pPr>
+            <a:endParaRPr lang="de-DE" dirty="0"/>
+          </a:p>
+          <a:p>
+            <a:pPr marL="0" indent="0">
+              <a:buNone/>
+            </a:pPr>
+            <a:endParaRPr lang="de-DE" dirty="0"/>
+          </a:p>
+          <a:p>
+            <a:pPr marL="0" indent="0">
+              <a:buNone/>
+            </a:pPr>
+            <a:endParaRPr lang="de-DE" dirty="0"/>
+          </a:p>
+          <a:p>
+            <a:pPr marL="0" indent="0">
+              <a:buNone/>
+            </a:pPr>
+            <a:r>
+              <a:rPr lang="de-DE" dirty="0"/>
+              <a:t>Analog für alle drei Pegel und beide Jahreszeiten, sowie für alle anderen möglichen Treiber</a:t>
+            </a:r>
+          </a:p>
+          <a:p>
+            <a:pPr marL="0" indent="0">
+              <a:buNone/>
+            </a:pPr>
+            <a:r>
+              <a:rPr lang="de-DE" dirty="0"/>
+              <a:t>		alle möglichen Treiber sind positiv autokorreliert</a:t>
+            </a:r>
+          </a:p>
+          <a:p>
+            <a:pPr marL="0" indent="0">
+              <a:buNone/>
+            </a:pPr>
+            <a:endParaRPr lang="de-DE" dirty="0"/>
+          </a:p>
+          <a:p>
+            <a:pPr marL="0" indent="0">
+              <a:buNone/>
+            </a:pPr>
+            <a:endParaRPr lang="de-DE" dirty="0"/>
+          </a:p>
+          <a:p>
+            <a:pPr marL="0" indent="0">
+              <a:buNone/>
+            </a:pPr>
+            <a:endParaRPr lang="de-DE" dirty="0"/>
+          </a:p>
+          <a:p>
+            <a:pPr marL="0" indent="0">
+              <a:buNone/>
+            </a:pPr>
+            <a:endParaRPr lang="de-DE" dirty="0"/>
+          </a:p>
+          <a:p>
+            <a:pPr marL="0" indent="0">
+              <a:buNone/>
+            </a:pPr>
+            <a:endParaRPr lang="de-DE" dirty="0"/>
+          </a:p>
+          <a:p>
+            <a:pPr marL="0" indent="0">
+              <a:buNone/>
+            </a:pPr>
+            <a:endParaRPr lang="de-DE" dirty="0"/>
+          </a:p>
+          <a:p>
+            <a:pPr marL="0" indent="0">
+              <a:buNone/>
+            </a:pPr>
+            <a:endParaRPr lang="de-DE" dirty="0"/>
+          </a:p>
+          <a:p>
+            <a:pPr marL="0" indent="0">
+              <a:buNone/>
+            </a:pPr>
+            <a:endParaRPr lang="de-DE" dirty="0"/>
+          </a:p>
+          <a:p>
+            <a:pPr marL="0" indent="0">
+              <a:buNone/>
+            </a:pPr>
+            <a:endParaRPr lang="de-DE" dirty="0"/>
+          </a:p>
+          <a:p>
+            <a:pPr marL="0" indent="0">
+              <a:buNone/>
+            </a:pPr>
+            <a:endParaRPr lang="de-DE" dirty="0"/>
+          </a:p>
+          <a:p>
+            <a:pPr marL="0" indent="0">
+              <a:buNone/>
+            </a:pPr>
+            <a:endParaRPr lang="de-DE" dirty="0"/>
+          </a:p>
+          <a:p>
+            <a:pPr marL="0" indent="0">
+              <a:buNone/>
+            </a:pPr>
+            <a:endParaRPr lang="de-DE" dirty="0"/>
+          </a:p>
+          <a:p>
+            <a:pPr marL="0" indent="0">
+              <a:buNone/>
+            </a:pPr>
+            <a:endParaRPr lang="de-DE" dirty="0"/>
+          </a:p>
+          <a:p>
+            <a:pPr marL="0" indent="0">
+              <a:buNone/>
+            </a:pPr>
+            <a:endParaRPr lang="de-DE" dirty="0"/>
+          </a:p>
+          <a:p>
+            <a:pPr marL="0" indent="0">
+              <a:buNone/>
+            </a:pPr>
+            <a:endParaRPr lang="de-DE" dirty="0"/>
+          </a:p>
+          <a:p>
+            <a:pPr marL="0" indent="0">
+              <a:buNone/>
+            </a:pPr>
+            <a:endParaRPr lang="de-DE" dirty="0"/>
+          </a:p>
+          <a:p>
+            <a:pPr marL="0" indent="0">
+              <a:buNone/>
+            </a:pPr>
+            <a:endParaRPr lang="de-DE" dirty="0"/>
+          </a:p>
+          <a:p>
+            <a:pPr marL="0" indent="0">
+              <a:buNone/>
+            </a:pPr>
+            <a:endParaRPr lang="de-DE" dirty="0"/>
+          </a:p>
+          <a:p>
+            <a:pPr marL="0" indent="0">
+              <a:buNone/>
+            </a:pPr>
+            <a:endParaRPr lang="de-DE" dirty="0"/>
+          </a:p>
+          <a:p>
+            <a:pPr marL="0" indent="0">
+              <a:buNone/>
+            </a:pPr>
+            <a:endParaRPr lang="de-DE" dirty="0"/>
+          </a:p>
+          <a:p>
+            <a:pPr marL="0" indent="0">
+              <a:buNone/>
+            </a:pPr>
+            <a:endParaRPr lang="de-DE" dirty="0"/>
+          </a:p>
+        </p:txBody>
+      </p:sp>
+      <p:pic>
+        <p:nvPicPr>
+          <p:cNvPr id="6" name="Grafik 5">
+            <a:extLst>
+              <a:ext uri="{FF2B5EF4-FFF2-40B4-BE49-F238E27FC236}">
+                <a16:creationId xmlns:a16="http://schemas.microsoft.com/office/drawing/2014/main" id="{A05D2712-5D3C-FB91-3A96-B64AE06D6CC9}"/>
+              </a:ext>
+            </a:extLst>
+          </p:cNvPr>
+          <p:cNvPicPr>
+            <a:picLocks noChangeAspect="1"/>
+          </p:cNvPicPr>
+          <p:nvPr/>
+        </p:nvPicPr>
+        <p:blipFill>
+          <a:blip r:embed="rId2">
+            <a:extLst>
+              <a:ext uri="{28A0092B-C50C-407E-A947-70E740481C1C}">
+                <a14:useLocalDpi xmlns:a14="http://schemas.microsoft.com/office/drawing/2010/main" val="0"/>
+              </a:ext>
+            </a:extLst>
+          </a:blip>
+          <a:stretch>
+            <a:fillRect/>
+          </a:stretch>
+        </p:blipFill>
+        <p:spPr>
+          <a:xfrm>
+            <a:off x="556037" y="1371314"/>
+            <a:ext cx="5663724" cy="3495326"/>
+          </a:xfrm>
+          <a:prstGeom prst="rect">
+            <a:avLst/>
+          </a:prstGeom>
+        </p:spPr>
+      </p:pic>
+      <p:cxnSp>
+        <p:nvCxnSpPr>
+          <p:cNvPr id="7" name="Gerade Verbindung mit Pfeil 6">
+            <a:extLst>
+              <a:ext uri="{FF2B5EF4-FFF2-40B4-BE49-F238E27FC236}">
+                <a16:creationId xmlns:a16="http://schemas.microsoft.com/office/drawing/2014/main" id="{2F2384C2-34A0-8580-EC2F-08BE18244F46}"/>
+              </a:ext>
+            </a:extLst>
+          </p:cNvPr>
+          <p:cNvCxnSpPr>
+            <a:cxnSpLocks/>
+          </p:cNvCxnSpPr>
+          <p:nvPr/>
+        </p:nvCxnSpPr>
+        <p:spPr>
+          <a:xfrm>
+            <a:off x="620382" y="5595050"/>
+            <a:ext cx="852818" cy="0"/>
+          </a:xfrm>
+          <a:prstGeom prst="straightConnector1">
+            <a:avLst/>
+          </a:prstGeom>
+          <a:ln>
+            <a:solidFill>
+              <a:schemeClr val="accent1">
+                <a:lumMod val="75000"/>
+              </a:schemeClr>
+            </a:solidFill>
+            <a:tailEnd type="triangle"/>
+          </a:ln>
+        </p:spPr>
+        <p:style>
+          <a:lnRef idx="1">
+            <a:schemeClr val="accent1"/>
+          </a:lnRef>
+          <a:fillRef idx="0">
+            <a:schemeClr val="accent1"/>
+          </a:fillRef>
+          <a:effectRef idx="0">
+            <a:schemeClr val="accent1"/>
+          </a:effectRef>
+          <a:fontRef idx="minor">
+            <a:schemeClr val="tx1"/>
+          </a:fontRef>
+        </p:style>
+      </p:cxnSp>
+      <p:pic>
+        <p:nvPicPr>
+          <p:cNvPr id="9" name="Grafik 8">
+            <a:extLst>
+              <a:ext uri="{FF2B5EF4-FFF2-40B4-BE49-F238E27FC236}">
+                <a16:creationId xmlns:a16="http://schemas.microsoft.com/office/drawing/2014/main" id="{4B28334D-A84B-5B3B-CCB4-C822C56F735E}"/>
+              </a:ext>
+            </a:extLst>
+          </p:cNvPr>
+          <p:cNvPicPr>
+            <a:picLocks noChangeAspect="1"/>
+          </p:cNvPicPr>
+          <p:nvPr/>
+        </p:nvPicPr>
+        <p:blipFill>
+          <a:blip r:embed="rId3">
+            <a:extLst>
+              <a:ext uri="{28A0092B-C50C-407E-A947-70E740481C1C}">
+                <a14:useLocalDpi xmlns:a14="http://schemas.microsoft.com/office/drawing/2010/main" val="0"/>
+              </a:ext>
+            </a:extLst>
+          </a:blip>
+          <a:stretch>
+            <a:fillRect/>
+          </a:stretch>
+        </p:blipFill>
+        <p:spPr>
+          <a:xfrm>
+            <a:off x="5892797" y="1371314"/>
+            <a:ext cx="5663724" cy="3495327"/>
+          </a:xfrm>
+          <a:prstGeom prst="rect">
+            <a:avLst/>
+          </a:prstGeom>
+        </p:spPr>
+      </p:pic>
     </p:spTree>
     <p:extLst>
       <p:ext uri="{BB962C8B-B14F-4D97-AF65-F5344CB8AC3E}">
-        <p14:creationId xmlns:p14="http://schemas.microsoft.com/office/powerpoint/2010/main" val="4264828743"/>
+        <p14:creationId xmlns:p14="http://schemas.microsoft.com/office/powerpoint/2010/main" val="2318862695"/>
       </p:ext>
     </p:extLst>
   </p:cSld>

</xml_diff>